<commit_message>
Finished poster ready to be reviewed
</commit_message>
<xml_diff>
--- a/Documents/PosterPresentation.pptx
+++ b/Documents/PosterPresentation.pptx
@@ -215,7 +215,7 @@
           <a:p>
             <a:fld id="{8A27B708-2555-834C-97B8-35CDF758D659}" type="datetimeFigureOut">
               <a:rPr lang="en-US" smtClean="0"/>
-              <a:t>11/19/22</a:t>
+              <a:t>11/22/22</a:t>
             </a:fld>
             <a:endParaRPr lang="en-US"/>
           </a:p>
@@ -380,7 +380,7 @@
           <a:p>
             <a:fld id="{EF175FB9-2012-4DBF-A192-38187E85331C}" type="datetimeFigureOut">
               <a:rPr lang="en-US" smtClean="0"/>
-              <a:t>11/19/22</a:t>
+              <a:t>11/22/22</a:t>
             </a:fld>
             <a:endParaRPr lang="en-US"/>
           </a:p>
@@ -2871,7 +2871,7 @@
         </p:nvSpPr>
         <p:spPr>
           <a:xfrm>
-            <a:off x="733868" y="5475566"/>
+            <a:off x="733868" y="5391629"/>
             <a:ext cx="13778969" cy="6822086"/>
           </a:xfrm>
           <a:ln>
@@ -2897,7 +2897,7 @@
                 <a:latin typeface="Arial" panose="020B0604020202020204" pitchFamily="34" charset="0"/>
                 <a:cs typeface="Arial" panose="020B0604020202020204" pitchFamily="34" charset="0"/>
               </a:rPr>
-              <a:t>Self-perceived health has been found to be a strong predictor of overall mortality [2]. To date, most self-perceived studies have been conducted in adults. Several studies have been done to predict self-perceived health in young people [1,4,6,7] revealing a high percentage of students reporting having good or excellent health, but none have been conducted in the United States. </a:t>
+              <a:t>Self-perceived health has been found to be a strong predictor of overall mortality [2]. To date, most self-perceived studies have been conducted in adults. Several studies have been done to predict self-perceived health in young people [1] revealing a high percentage of students reporting having good or excellent health, but none have been conducted in the United States. </a:t>
             </a:r>
           </a:p>
           <a:p>
@@ -2961,7 +2961,7 @@
                 <a:latin typeface="Arial" panose="020B0604020202020204" pitchFamily="34" charset="0"/>
                 <a:cs typeface="Arial" panose="020B0604020202020204" pitchFamily="34" charset="0"/>
               </a:rPr>
-              <a:t>We hypothesize psychological health and social support will be the most important predictors of self-perceived health. </a:t>
+              <a:t>We hypothesize psychological health and social support will be the most important predictors of self-perceived health (SPH). </a:t>
             </a:r>
             <a:endParaRPr lang="en-US" sz="3600" b="1" dirty="0">
               <a:latin typeface="Arial" panose="020B0604020202020204" pitchFamily="34" charset="0"/>
@@ -3020,7 +3020,7 @@
         </p:nvSpPr>
         <p:spPr>
           <a:xfrm>
-            <a:off x="660368" y="21253517"/>
+            <a:off x="660368" y="20964551"/>
             <a:ext cx="13585370" cy="1066800"/>
           </a:xfrm>
           <a:solidFill>
@@ -3092,8 +3092,8 @@
         </p:nvSpPr>
         <p:spPr>
           <a:xfrm>
-            <a:off x="29609145" y="27081108"/>
-            <a:ext cx="13585370" cy="7315200"/>
+            <a:off x="29727525" y="27885342"/>
+            <a:ext cx="14197727" cy="4447404"/>
           </a:xfrm>
         </p:spPr>
         <p:txBody>
@@ -3104,146 +3104,10 @@
               <a:buFont typeface="+mj-lt"/>
               <a:buAutoNum type="arabicPeriod"/>
             </a:pPr>
-            <a:r>
-              <a:rPr lang="en-US" sz="3400" dirty="0">
-                <a:effectLst/>
-                <a:latin typeface="Arial"/>
-                <a:cs typeface="Times New Roman"/>
-              </a:rPr>
-              <a:t>Mishra, </a:t>
-            </a:r>
-            <a:r>
-              <a:rPr lang="en-US" sz="3400" dirty="0" err="1">
-                <a:effectLst/>
-                <a:latin typeface="Arial"/>
-                <a:cs typeface="Times New Roman"/>
-              </a:rPr>
-              <a:t>Tejaswini</a:t>
-            </a:r>
-            <a:r>
-              <a:rPr lang="en-US" sz="3400" dirty="0">
-                <a:effectLst/>
-                <a:latin typeface="Arial"/>
-                <a:cs typeface="Times New Roman"/>
-              </a:rPr>
-              <a:t>, Meng Wang, Ahmed A. </a:t>
-            </a:r>
-            <a:r>
-              <a:rPr lang="en-US" sz="3400" dirty="0" err="1">
-                <a:effectLst/>
-                <a:latin typeface="Arial"/>
-                <a:cs typeface="Times New Roman"/>
-              </a:rPr>
-              <a:t>Metwally</a:t>
-            </a:r>
-            <a:r>
-              <a:rPr lang="en-US" sz="3400" dirty="0">
-                <a:effectLst/>
-                <a:latin typeface="Arial"/>
-                <a:cs typeface="Times New Roman"/>
-              </a:rPr>
-              <a:t>, </a:t>
-            </a:r>
-            <a:r>
-              <a:rPr lang="en-US" sz="3400" dirty="0" err="1">
-                <a:effectLst/>
-                <a:latin typeface="Arial"/>
-                <a:cs typeface="Times New Roman"/>
-              </a:rPr>
-              <a:t>Gireesh</a:t>
-            </a:r>
-            <a:r>
-              <a:rPr lang="en-US" sz="3400" dirty="0">
-                <a:effectLst/>
-                <a:latin typeface="Arial"/>
-                <a:cs typeface="Times New Roman"/>
-              </a:rPr>
-              <a:t> K. </a:t>
-            </a:r>
-            <a:r>
-              <a:rPr lang="en-US" sz="3400" dirty="0" err="1">
-                <a:effectLst/>
-                <a:latin typeface="Arial"/>
-                <a:cs typeface="Times New Roman"/>
-              </a:rPr>
-              <a:t>Bogu</a:t>
-            </a:r>
-            <a:r>
-              <a:rPr lang="en-US" sz="3400" dirty="0">
-                <a:effectLst/>
-                <a:latin typeface="Arial"/>
-                <a:cs typeface="Times New Roman"/>
-              </a:rPr>
-              <a:t>, Andrew W. Brooks, Amir Bahmani, </a:t>
-            </a:r>
-            <a:r>
-              <a:rPr lang="en-US" sz="3400" dirty="0" err="1">
-                <a:effectLst/>
-                <a:latin typeface="Arial"/>
-                <a:cs typeface="Times New Roman"/>
-              </a:rPr>
-              <a:t>Arash</a:t>
-            </a:r>
-            <a:r>
-              <a:rPr lang="en-US" sz="3400" dirty="0">
-                <a:effectLst/>
-                <a:latin typeface="Arial"/>
-                <a:cs typeface="Times New Roman"/>
-              </a:rPr>
-              <a:t> </a:t>
-            </a:r>
-            <a:r>
-              <a:rPr lang="en-US" sz="3400" dirty="0" err="1">
-                <a:effectLst/>
-                <a:latin typeface="Arial"/>
-                <a:cs typeface="Times New Roman"/>
-              </a:rPr>
-              <a:t>Alavi</a:t>
-            </a:r>
-            <a:r>
-              <a:rPr lang="en-US" sz="3400" dirty="0">
-                <a:effectLst/>
-                <a:latin typeface="Arial"/>
-                <a:cs typeface="Times New Roman"/>
-              </a:rPr>
-              <a:t>, et al. “Early Detection Of COVID-19 Using A Smartwatch.” </a:t>
-            </a:r>
-            <a:r>
-              <a:rPr lang="en-US" sz="3400" i="1" dirty="0" err="1">
-                <a:effectLst/>
-                <a:latin typeface="Arial"/>
-                <a:cs typeface="Times New Roman"/>
-              </a:rPr>
-              <a:t>MedRxiv</a:t>
-            </a:r>
-            <a:r>
-              <a:rPr lang="en-US" sz="3400" dirty="0">
-                <a:effectLst/>
-                <a:latin typeface="Arial"/>
-                <a:cs typeface="Times New Roman"/>
-              </a:rPr>
-              <a:t>, July 7, 2020, 2020.07.06.20147512. </a:t>
-            </a:r>
-            <a:r>
-              <a:rPr lang="en-US" sz="3400" dirty="0">
-                <a:effectLst/>
-                <a:latin typeface="Arial"/>
-                <a:cs typeface="Times New Roman"/>
-                <a:hlinkClick r:id="rId3"/>
-              </a:rPr>
-              <a:t>https://doi.org/10.1101/2020.07.06.20147512</a:t>
-            </a:r>
-            <a:r>
-              <a:rPr lang="en-US" sz="3400" dirty="0">
-                <a:effectLst/>
-                <a:latin typeface="Arial"/>
-                <a:cs typeface="Times New Roman"/>
-              </a:rPr>
-              <a:t>.</a:t>
-            </a:r>
-            <a:endParaRPr lang="en-US" sz="3400" dirty="0">
-              <a:latin typeface="Arial"/>
-              <a:cs typeface="Times New Roman"/>
+            <a:endParaRPr lang="en-US" sz="2600" dirty="0">
+              <a:effectLst/>
+              <a:latin typeface="Arial" panose="020B0604020202020204" pitchFamily="34" charset="0"/>
+              <a:cs typeface="Arial" panose="020B0604020202020204" pitchFamily="34" charset="0"/>
             </a:endParaRPr>
           </a:p>
           <a:p>
@@ -3252,69 +3116,98 @@
               <a:buAutoNum type="arabicPeriod"/>
             </a:pPr>
             <a:r>
-              <a:rPr lang="en-US" sz="3400" dirty="0">
+              <a:rPr lang="en-US" sz="2600" b="0" i="0" dirty="0">
                 <a:effectLst/>
-                <a:latin typeface="Arial"/>
-                <a:cs typeface="Times New Roman"/>
-              </a:rPr>
-              <a:t>Natarajan, Aravind, Hao-Wei </a:t>
-            </a:r>
-            <a:r>
-              <a:rPr lang="en-US" sz="3400" dirty="0" err="1">
+                <a:latin typeface="Arial" panose="020B0604020202020204" pitchFamily="34" charset="0"/>
+                <a:cs typeface="Arial" panose="020B0604020202020204" pitchFamily="34" charset="0"/>
+              </a:rPr>
+              <a:t>Fernandes, G., &amp; </a:t>
+            </a:r>
+            <a:r>
+              <a:rPr lang="en-US" sz="2600" b="0" i="0" dirty="0" err="1">
                 <a:effectLst/>
-                <a:latin typeface="Arial"/>
-                <a:cs typeface="Times New Roman"/>
-              </a:rPr>
-              <a:t>Su</a:t>
-            </a:r>
-            <a:r>
-              <a:rPr lang="en-US" sz="3400" dirty="0">
+                <a:latin typeface="Arial" panose="020B0604020202020204" pitchFamily="34" charset="0"/>
+                <a:cs typeface="Arial" panose="020B0604020202020204" pitchFamily="34" charset="0"/>
+              </a:rPr>
+              <a:t>Lemos</a:t>
+            </a:r>
+            <a:r>
+              <a:rPr lang="en-US" sz="2600" b="0" i="0" dirty="0">
                 <a:effectLst/>
-                <a:latin typeface="Arial"/>
-                <a:cs typeface="Times New Roman"/>
-              </a:rPr>
-              <a:t>, and Conor Heneghan. “Assessment of Physiological Signs Associated with COVID-19 Measured Using Wearable Devices.” </a:t>
-            </a:r>
-            <a:r>
-              <a:rPr lang="en-US" sz="3400" i="1" dirty="0" err="1">
+                <a:latin typeface="Arial" panose="020B0604020202020204" pitchFamily="34" charset="0"/>
+                <a:cs typeface="Arial" panose="020B0604020202020204" pitchFamily="34" charset="0"/>
+              </a:rPr>
+              <a:t>, S. (2022). Quality of life and self-perceived health of </a:t>
+            </a:r>
+            <a:r>
+              <a:rPr lang="en-US" sz="2600" dirty="0">
+                <a:latin typeface="Arial" panose="020B0604020202020204" pitchFamily="34" charset="0"/>
+                <a:cs typeface="Arial" panose="020B0604020202020204" pitchFamily="34" charset="0"/>
+              </a:rPr>
+              <a:t> </a:t>
+            </a:r>
+            <a:r>
+              <a:rPr lang="en-US" sz="2600" b="0" i="0" dirty="0">
                 <a:effectLst/>
-                <a:latin typeface="Arial"/>
-                <a:cs typeface="Times New Roman"/>
-              </a:rPr>
-              <a:t>Npj</a:t>
-            </a:r>
-            <a:r>
-              <a:rPr lang="en-US" sz="3400" i="1" dirty="0">
+                <a:latin typeface="Arial" panose="020B0604020202020204" pitchFamily="34" charset="0"/>
+                <a:cs typeface="Arial" panose="020B0604020202020204" pitchFamily="34" charset="0"/>
+              </a:rPr>
+              <a:t>adolescents in Middle School. </a:t>
+            </a:r>
+            <a:r>
+              <a:rPr lang="en-US" sz="2600" b="0" i="1" dirty="0" err="1">
                 <a:effectLst/>
-                <a:latin typeface="Arial"/>
-                <a:cs typeface="Times New Roman"/>
-              </a:rPr>
-              <a:t> Digital Medicine</a:t>
-            </a:r>
-            <a:r>
-              <a:rPr lang="en-US" sz="3400" dirty="0">
+                <a:latin typeface="Arial" panose="020B0604020202020204" pitchFamily="34" charset="0"/>
+                <a:cs typeface="Arial" panose="020B0604020202020204" pitchFamily="34" charset="0"/>
+              </a:rPr>
+              <a:t>CoDAS</a:t>
+            </a:r>
+            <a:r>
+              <a:rPr lang="en-US" sz="2600" b="0" i="0" dirty="0">
                 <a:effectLst/>
-                <a:latin typeface="Arial"/>
-                <a:cs typeface="Times New Roman"/>
-              </a:rPr>
-              <a:t> 3, no. 1 (November 30, 2020): 1–8. </a:t>
-            </a:r>
-            <a:r>
-              <a:rPr lang="en-US" sz="3400" dirty="0">
+                <a:latin typeface="Arial" panose="020B0604020202020204" pitchFamily="34" charset="0"/>
+                <a:cs typeface="Arial" panose="020B0604020202020204" pitchFamily="34" charset="0"/>
+              </a:rPr>
+              <a:t>, </a:t>
+            </a:r>
+            <a:r>
+              <a:rPr lang="en-US" sz="2600" b="0" i="1" dirty="0">
                 <a:effectLst/>
-                <a:latin typeface="Arial"/>
-                <a:cs typeface="Times New Roman"/>
-                <a:hlinkClick r:id="rId4"/>
-              </a:rPr>
-              <a:t>https://doi.org/10.1038/s41746-020-00363-7</a:t>
-            </a:r>
-            <a:r>
-              <a:rPr lang="en-US" sz="3400" dirty="0">
+                <a:latin typeface="Arial" panose="020B0604020202020204" pitchFamily="34" charset="0"/>
+                <a:cs typeface="Arial" panose="020B0604020202020204" pitchFamily="34" charset="0"/>
+              </a:rPr>
+              <a:t>34</a:t>
+            </a:r>
+            <a:r>
+              <a:rPr lang="en-US" sz="2600" b="0" i="0" dirty="0">
                 <a:effectLst/>
-                <a:latin typeface="Arial"/>
-                <a:cs typeface="Times New Roman"/>
-              </a:rPr>
-              <a:t>.</a:t>
+                <a:latin typeface="Arial" panose="020B0604020202020204" pitchFamily="34" charset="0"/>
+                <a:cs typeface="Arial" panose="020B0604020202020204" pitchFamily="34" charset="0"/>
+              </a:rPr>
+              <a:t>(6), e20210046. </a:t>
+            </a:r>
+            <a:r>
+              <a:rPr lang="en-US" sz="2600" b="0" i="0" strike="noStrike" dirty="0">
+                <a:effectLst/>
+                <a:latin typeface="Arial" panose="020B0604020202020204" pitchFamily="34" charset="0"/>
+                <a:cs typeface="Arial" panose="020B0604020202020204" pitchFamily="34" charset="0"/>
+                <a:hlinkClick r:id="rId3">
+                  <a:extLst>
+                    <a:ext uri="{A12FA001-AC4F-418D-AE19-62706E023703}">
+                      <ahyp:hlinkClr xmlns:ahyp="http://schemas.microsoft.com/office/drawing/2018/hyperlinkcolor" val="tx"/>
+                    </a:ext>
+                  </a:extLst>
+                </a:hlinkClick>
+              </a:rPr>
+              <a:t>https://doi.org/10.1590/2317-1782/20212021046</a:t>
+            </a:r>
+            <a:r>
+              <a:rPr lang="en-US" sz="2600" b="0" i="0" dirty="0">
+                <a:effectLst/>
+                <a:latin typeface="Arial" panose="020B0604020202020204" pitchFamily="34" charset="0"/>
+                <a:cs typeface="Arial" panose="020B0604020202020204" pitchFamily="34" charset="0"/>
+              </a:rPr>
+              <a:t> </a:t>
             </a:r>
           </a:p>
           <a:p>
@@ -3322,20 +3215,235 @@
               <a:buFont typeface="+mj-lt"/>
               <a:buAutoNum type="arabicPeriod"/>
             </a:pPr>
-            <a:endParaRPr lang="en-US" sz="3200" dirty="0">
-              <a:effectLst/>
-              <a:latin typeface="Times New Roman"/>
-              <a:cs typeface="Times New Roman"/>
-            </a:endParaRPr>
+            <a:r>
+              <a:rPr lang="en-US" sz="2600" b="0" i="0" dirty="0" err="1">
+                <a:effectLst/>
+                <a:latin typeface="Arial" panose="020B0604020202020204" pitchFamily="34" charset="0"/>
+                <a:cs typeface="Arial" panose="020B0604020202020204" pitchFamily="34" charset="0"/>
+              </a:rPr>
+              <a:t>Heistaro</a:t>
+            </a:r>
+            <a:r>
+              <a:rPr lang="en-US" sz="2600" b="0" i="0" dirty="0">
+                <a:effectLst/>
+                <a:latin typeface="Arial" panose="020B0604020202020204" pitchFamily="34" charset="0"/>
+                <a:cs typeface="Arial" panose="020B0604020202020204" pitchFamily="34" charset="0"/>
+              </a:rPr>
+              <a:t>, S., </a:t>
+            </a:r>
+            <a:r>
+              <a:rPr lang="en-US" sz="2600" b="0" i="0" dirty="0" err="1">
+                <a:effectLst/>
+                <a:latin typeface="Arial" panose="020B0604020202020204" pitchFamily="34" charset="0"/>
+                <a:cs typeface="Arial" panose="020B0604020202020204" pitchFamily="34" charset="0"/>
+              </a:rPr>
+              <a:t>Jousilahti</a:t>
+            </a:r>
+            <a:r>
+              <a:rPr lang="en-US" sz="2600" b="0" i="0" dirty="0">
+                <a:effectLst/>
+                <a:latin typeface="Arial" panose="020B0604020202020204" pitchFamily="34" charset="0"/>
+                <a:cs typeface="Arial" panose="020B0604020202020204" pitchFamily="34" charset="0"/>
+              </a:rPr>
+              <a:t>, P., </a:t>
+            </a:r>
+            <a:r>
+              <a:rPr lang="en-US" sz="2600" b="0" i="0" dirty="0" err="1">
+                <a:effectLst/>
+                <a:latin typeface="Arial" panose="020B0604020202020204" pitchFamily="34" charset="0"/>
+                <a:cs typeface="Arial" panose="020B0604020202020204" pitchFamily="34" charset="0"/>
+              </a:rPr>
+              <a:t>Lahelma</a:t>
+            </a:r>
+            <a:r>
+              <a:rPr lang="en-US" sz="2600" b="0" i="0" dirty="0">
+                <a:effectLst/>
+                <a:latin typeface="Arial" panose="020B0604020202020204" pitchFamily="34" charset="0"/>
+                <a:cs typeface="Arial" panose="020B0604020202020204" pitchFamily="34" charset="0"/>
+              </a:rPr>
+              <a:t>, E., </a:t>
+            </a:r>
+            <a:r>
+              <a:rPr lang="en-US" sz="2600" b="0" i="0" dirty="0" err="1">
+                <a:effectLst/>
+                <a:latin typeface="Arial" panose="020B0604020202020204" pitchFamily="34" charset="0"/>
+                <a:cs typeface="Arial" panose="020B0604020202020204" pitchFamily="34" charset="0"/>
+              </a:rPr>
+              <a:t>Vartiainen</a:t>
+            </a:r>
+            <a:r>
+              <a:rPr lang="en-US" sz="2600" b="0" i="0" dirty="0">
+                <a:effectLst/>
+                <a:latin typeface="Arial" panose="020B0604020202020204" pitchFamily="34" charset="0"/>
+                <a:cs typeface="Arial" panose="020B0604020202020204" pitchFamily="34" charset="0"/>
+              </a:rPr>
+              <a:t>, E., &amp; </a:t>
+            </a:r>
+            <a:r>
+              <a:rPr lang="en-US" sz="2600" b="0" i="0" dirty="0" err="1">
+                <a:effectLst/>
+                <a:latin typeface="Arial" panose="020B0604020202020204" pitchFamily="34" charset="0"/>
+                <a:cs typeface="Arial" panose="020B0604020202020204" pitchFamily="34" charset="0"/>
+              </a:rPr>
+              <a:t>Puska</a:t>
+            </a:r>
+            <a:r>
+              <a:rPr lang="en-US" sz="2600" b="0" i="0" dirty="0">
+                <a:effectLst/>
+                <a:latin typeface="Arial" panose="020B0604020202020204" pitchFamily="34" charset="0"/>
+                <a:cs typeface="Arial" panose="020B0604020202020204" pitchFamily="34" charset="0"/>
+              </a:rPr>
+              <a:t>, P. (2001). Self rated health and mortality: a long term prospective study in eastern Finland. </a:t>
+            </a:r>
+            <a:r>
+              <a:rPr lang="en-US" sz="2600" b="0" i="1" dirty="0">
+                <a:effectLst/>
+                <a:latin typeface="Arial" panose="020B0604020202020204" pitchFamily="34" charset="0"/>
+                <a:cs typeface="Arial" panose="020B0604020202020204" pitchFamily="34" charset="0"/>
+              </a:rPr>
+              <a:t>Journal of epidemiology and community health</a:t>
+            </a:r>
+            <a:r>
+              <a:rPr lang="en-US" sz="2600" b="0" i="0" dirty="0">
+                <a:effectLst/>
+                <a:latin typeface="Arial" panose="020B0604020202020204" pitchFamily="34" charset="0"/>
+                <a:cs typeface="Arial" panose="020B0604020202020204" pitchFamily="34" charset="0"/>
+              </a:rPr>
+              <a:t>, </a:t>
+            </a:r>
+            <a:r>
+              <a:rPr lang="en-US" sz="2600" b="0" i="1" dirty="0">
+                <a:effectLst/>
+                <a:latin typeface="Arial" panose="020B0604020202020204" pitchFamily="34" charset="0"/>
+                <a:cs typeface="Arial" panose="020B0604020202020204" pitchFamily="34" charset="0"/>
+              </a:rPr>
+              <a:t>55</a:t>
+            </a:r>
+            <a:r>
+              <a:rPr lang="en-US" sz="2600" b="0" i="0" dirty="0">
+                <a:effectLst/>
+                <a:latin typeface="Arial" panose="020B0604020202020204" pitchFamily="34" charset="0"/>
+                <a:cs typeface="Arial" panose="020B0604020202020204" pitchFamily="34" charset="0"/>
+              </a:rPr>
+              <a:t>(4), 227–232. </a:t>
+            </a:r>
+            <a:r>
+              <a:rPr lang="en-US" sz="2600" b="0" i="0" strike="noStrike" dirty="0">
+                <a:effectLst/>
+                <a:latin typeface="Arial" panose="020B0604020202020204" pitchFamily="34" charset="0"/>
+                <a:cs typeface="Arial" panose="020B0604020202020204" pitchFamily="34" charset="0"/>
+                <a:hlinkClick r:id="rId4">
+                  <a:extLst>
+                    <a:ext uri="{A12FA001-AC4F-418D-AE19-62706E023703}">
+                      <ahyp:hlinkClr xmlns:ahyp="http://schemas.microsoft.com/office/drawing/2018/hyperlinkcolor" val="tx"/>
+                    </a:ext>
+                  </a:extLst>
+                </a:hlinkClick>
+              </a:rPr>
+              <a:t>https://doi.org/10.1136/jech.55.4.227</a:t>
+            </a:r>
+            <a:r>
+              <a:rPr lang="en-US" sz="2600" b="0" i="0" dirty="0">
+                <a:effectLst/>
+                <a:latin typeface="Arial" panose="020B0604020202020204" pitchFamily="34" charset="0"/>
+                <a:cs typeface="Arial" panose="020B0604020202020204" pitchFamily="34" charset="0"/>
+              </a:rPr>
+              <a:t> </a:t>
+            </a:r>
           </a:p>
           <a:p>
             <a:pPr marL="742950" indent="-742950">
               <a:buFont typeface="+mj-lt"/>
               <a:buAutoNum type="arabicPeriod"/>
             </a:pPr>
-            <a:endParaRPr lang="en-US" sz="4200" dirty="0">
-              <a:latin typeface="Times New Roman"/>
-              <a:cs typeface="Times New Roman"/>
+            <a:r>
+              <a:rPr lang="en-US" sz="2600" b="0" i="0" dirty="0">
+                <a:effectLst/>
+                <a:latin typeface="Arial" panose="020B0604020202020204" pitchFamily="34" charset="0"/>
+                <a:cs typeface="Arial" panose="020B0604020202020204" pitchFamily="34" charset="0"/>
+              </a:rPr>
+              <a:t>Krause, N. M., &amp; Jay, G. M. (1994).  What Do Global Self-Rated Health Items Measure? </a:t>
+            </a:r>
+            <a:r>
+              <a:rPr lang="en-US" sz="2600" b="0" i="1" dirty="0">
+                <a:effectLst/>
+                <a:latin typeface="Arial" panose="020B0604020202020204" pitchFamily="34" charset="0"/>
+                <a:cs typeface="Arial" panose="020B0604020202020204" pitchFamily="34" charset="0"/>
+              </a:rPr>
+              <a:t>Medical Care</a:t>
+            </a:r>
+            <a:r>
+              <a:rPr lang="en-US" sz="2600" b="0" i="0" dirty="0">
+                <a:effectLst/>
+                <a:latin typeface="Arial" panose="020B0604020202020204" pitchFamily="34" charset="0"/>
+                <a:cs typeface="Arial" panose="020B0604020202020204" pitchFamily="34" charset="0"/>
+              </a:rPr>
+              <a:t>, 32 (9), 930-942.  </a:t>
+            </a:r>
+          </a:p>
+          <a:p>
+            <a:pPr marL="742950" indent="-742950">
+              <a:buFont typeface="+mj-lt"/>
+              <a:buAutoNum type="arabicPeriod"/>
+            </a:pPr>
+            <a:r>
+              <a:rPr lang="en-US" sz="2600" b="0" i="0" strike="noStrike" dirty="0">
+                <a:effectLst/>
+                <a:latin typeface="Arial" panose="020B0604020202020204" pitchFamily="34" charset="0"/>
+                <a:cs typeface="Arial" panose="020B0604020202020204" pitchFamily="34" charset="0"/>
+              </a:rPr>
+              <a:t>Minnesota Student Survey.   </a:t>
+            </a:r>
+            <a:r>
+              <a:rPr lang="en-US" sz="2600" b="0" i="0" dirty="0">
+                <a:effectLst/>
+                <a:latin typeface="Arial" panose="020B0604020202020204" pitchFamily="34" charset="0"/>
+                <a:cs typeface="Arial" panose="020B0604020202020204" pitchFamily="34" charset="0"/>
+                <a:hlinkClick r:id="rId5">
+                  <a:extLst>
+                    <a:ext uri="{A12FA001-AC4F-418D-AE19-62706E023703}">
+                      <ahyp:hlinkClr xmlns:ahyp="http://schemas.microsoft.com/office/drawing/2018/hyperlinkcolor" val="tx"/>
+                    </a:ext>
+                  </a:extLst>
+                </a:hlinkClick>
+              </a:rPr>
+              <a:t>https://education.mn.gov/MDE/dse/health/mss/mde059027</a:t>
+            </a:r>
+            <a:r>
+              <a:rPr lang="en-US" sz="2600" b="0" i="0" strike="noStrike" dirty="0">
+                <a:effectLst/>
+                <a:latin typeface="Arial" panose="020B0604020202020204" pitchFamily="34" charset="0"/>
+                <a:cs typeface="Arial" panose="020B0604020202020204" pitchFamily="34" charset="0"/>
+              </a:rPr>
+              <a:t>.</a:t>
+            </a:r>
+            <a:endParaRPr lang="en-US" sz="2600" dirty="0">
+              <a:latin typeface="Arial" panose="020B0604020202020204" pitchFamily="34" charset="0"/>
+              <a:cs typeface="Arial" panose="020B0604020202020204" pitchFamily="34" charset="0"/>
+            </a:endParaRPr>
+          </a:p>
+          <a:p>
+            <a:pPr marL="742950" indent="-742950">
+              <a:buFont typeface="+mj-lt"/>
+              <a:buAutoNum type="arabicPeriod"/>
+            </a:pPr>
+            <a:endParaRPr lang="en-US" sz="2600" b="0" i="0" dirty="0">
+              <a:solidFill>
+                <a:srgbClr val="000000"/>
+              </a:solidFill>
+              <a:effectLst/>
+              <a:latin typeface="Arial" panose="020B0604020202020204" pitchFamily="34" charset="0"/>
+              <a:cs typeface="Arial" panose="020B0604020202020204" pitchFamily="34" charset="0"/>
+            </a:endParaRPr>
+          </a:p>
+          <a:p>
+            <a:pPr marL="742950" indent="-742950">
+              <a:buFont typeface="+mj-lt"/>
+              <a:buAutoNum type="arabicPeriod"/>
+            </a:pPr>
+            <a:endParaRPr lang="en-US" sz="2600" dirty="0">
+              <a:latin typeface="Arial" panose="020B0604020202020204" pitchFamily="34" charset="0"/>
+              <a:cs typeface="Arial" panose="020B0604020202020204" pitchFamily="34" charset="0"/>
             </a:endParaRPr>
           </a:p>
         </p:txBody>
@@ -3352,7 +3460,7 @@
         </p:nvSpPr>
         <p:spPr>
           <a:xfrm>
-            <a:off x="29609145" y="19013572"/>
+            <a:off x="29609145" y="17832946"/>
             <a:ext cx="13585370" cy="1066800"/>
           </a:xfrm>
           <a:solidFill>
@@ -3390,8 +3498,8 @@
         </p:nvSpPr>
         <p:spPr>
           <a:xfrm>
-            <a:off x="29609145" y="20251357"/>
-            <a:ext cx="13585370" cy="6598549"/>
+            <a:off x="29609145" y="19027972"/>
+            <a:ext cx="13585370" cy="8342965"/>
           </a:xfrm>
         </p:spPr>
         <p:txBody>
@@ -3419,7 +3527,7 @@
                 <a:latin typeface="Arial"/>
                 <a:cs typeface="Times New Roman"/>
               </a:rPr>
-              <a:t>Reduced memory usage of the ETL pipeline</a:t>
+              <a:t>Feeling good about the future has a statistically significant impact on SPH. </a:t>
             </a:r>
           </a:p>
           <a:p>
@@ -3432,7 +3540,7 @@
                 <a:latin typeface="Arial"/>
                 <a:cs typeface="Times New Roman"/>
               </a:rPr>
-              <a:t>Expanded type and resolution of data in storage</a:t>
+              <a:t>Creating clusters that are ~80% accurate for extreme values of SPH.</a:t>
             </a:r>
           </a:p>
           <a:p>
@@ -3445,7 +3553,7 @@
                 <a:latin typeface="Arial"/>
                 <a:cs typeface="Times New Roman"/>
               </a:rPr>
-              <a:t>Created a foundation for future wearable data processing </a:t>
+              <a:t>Random forest, LDA, and Logistic regression models were able to classify at a 73% - 80% classification rate with only 20 predictor variables</a:t>
             </a:r>
           </a:p>
           <a:p>
@@ -3483,7 +3591,7 @@
                 <a:latin typeface="Arial"/>
                 <a:cs typeface="Times New Roman"/>
               </a:rPr>
-              <a:t>Consider using a larger training data set </a:t>
+              <a:t>Repeat analyses with a balanced data set </a:t>
             </a:r>
           </a:p>
           <a:p>
@@ -3513,7 +3621,7 @@
         </p:nvSpPr>
         <p:spPr>
           <a:xfrm>
-            <a:off x="29609145" y="25870086"/>
+            <a:off x="29693473" y="27003065"/>
             <a:ext cx="13585370" cy="1066800"/>
           </a:xfrm>
           <a:solidFill>
@@ -3551,7 +3659,7 @@
         </p:nvSpPr>
         <p:spPr>
           <a:xfrm>
-            <a:off x="15152917" y="5478222"/>
+            <a:off x="15152917" y="5353527"/>
             <a:ext cx="13585370" cy="26670000"/>
           </a:xfrm>
         </p:spPr>
@@ -3599,7 +3707,7 @@
             </a:endParaRPr>
           </a:p>
           <a:p>
-            <a:endParaRPr lang="en-US" sz="900" i="1" dirty="0">
+            <a:endParaRPr lang="en-US" sz="500" i="1" dirty="0">
               <a:latin typeface="Arial"/>
               <a:ea typeface="+mn-lt"/>
               <a:cs typeface="+mn-lt"/>
@@ -3751,67 +3859,74 @@
             </a:endParaRPr>
           </a:p>
           <a:p>
-            <a:endParaRPr lang="en-US" sz="3700" b="1" dirty="0">
+            <a:endParaRPr lang="en-US" sz="100" b="1" dirty="0">
               <a:latin typeface="Arial"/>
               <a:ea typeface="+mn-lt"/>
               <a:cs typeface="+mn-lt"/>
             </a:endParaRPr>
           </a:p>
           <a:p>
+            <a:r>
+              <a:rPr lang="en-US" sz="3700" b="1" dirty="0">
+                <a:latin typeface="Arial"/>
+                <a:ea typeface="+mn-lt"/>
+                <a:cs typeface="+mn-lt"/>
+              </a:rPr>
+              <a:t>2. Supervised Model Development </a:t>
+            </a:r>
             <a:endParaRPr lang="en-US" sz="3700" b="1" dirty="0">
+              <a:latin typeface="Arial"/>
+              <a:cs typeface="Times New Roman"/>
+            </a:endParaRPr>
+          </a:p>
+          <a:p>
+            <a:r>
+              <a:rPr lang="en-US" sz="3700" b="1" dirty="0">
+                <a:latin typeface="Arial"/>
+                <a:ea typeface="+mn-lt"/>
+                <a:cs typeface="+mn-lt"/>
+              </a:rPr>
+              <a:t>Random Forest</a:t>
+            </a:r>
+            <a:r>
+              <a:rPr lang="en-US" sz="3700" dirty="0">
+                <a:latin typeface="Arial"/>
+                <a:ea typeface="+mn-lt"/>
+                <a:cs typeface="+mn-lt"/>
+              </a:rPr>
+              <a:t>: </a:t>
+            </a:r>
+            <a:r>
+              <a:rPr lang="en-US" sz="3600" dirty="0">
+                <a:latin typeface="Arial"/>
+                <a:ea typeface="+mn-lt"/>
+                <a:cs typeface="+mn-lt"/>
+              </a:rPr>
+              <a:t>RF was run containing all predictors. After averaging the impurity metric, there were 20 predictors that decreased the model impurity the most (most important), with these 5 having the greatest contribution. A RF with 5 predictors: </a:t>
+            </a:r>
+            <a:r>
+              <a:rPr lang="en-US" sz="3700" dirty="0">
+                <a:latin typeface="Arial"/>
+                <a:cs typeface="Arial"/>
+              </a:rPr>
+              <a:t>72.8% accuracy rate,15.1% misclassification rate for SPH = good, and 47.2% misclassification for SPH = Poor. </a:t>
+            </a:r>
+          </a:p>
+          <a:p>
+            <a:endParaRPr lang="en-US" sz="3700" dirty="0">
               <a:latin typeface="Arial"/>
               <a:ea typeface="+mn-lt"/>
               <a:cs typeface="+mn-lt"/>
             </a:endParaRPr>
           </a:p>
           <a:p>
-            <a:endParaRPr lang="en-US" sz="3700" b="1" dirty="0">
+            <a:endParaRPr lang="en-US" sz="3700" dirty="0">
               <a:latin typeface="Arial"/>
               <a:ea typeface="+mn-lt"/>
               <a:cs typeface="+mn-lt"/>
             </a:endParaRPr>
           </a:p>
           <a:p>
-            <a:r>
-              <a:rPr lang="en-US" sz="3700" b="1" dirty="0">
-                <a:latin typeface="Arial"/>
-                <a:ea typeface="+mn-lt"/>
-                <a:cs typeface="+mn-lt"/>
-              </a:rPr>
-              <a:t>2. Supervised Model Development </a:t>
-            </a:r>
-            <a:endParaRPr lang="en-US" sz="3700" b="1" dirty="0">
-              <a:latin typeface="Arial"/>
-              <a:cs typeface="Times New Roman"/>
-            </a:endParaRPr>
-          </a:p>
-          <a:p>
-            <a:r>
-              <a:rPr lang="en-US" sz="3700" b="1" dirty="0">
-                <a:latin typeface="Arial"/>
-                <a:ea typeface="+mn-lt"/>
-                <a:cs typeface="+mn-lt"/>
-              </a:rPr>
-              <a:t>Logistic Regression</a:t>
-            </a:r>
-            <a:r>
-              <a:rPr lang="en-US" sz="3700" dirty="0">
-                <a:latin typeface="Arial"/>
-                <a:ea typeface="+mn-lt"/>
-                <a:cs typeface="+mn-lt"/>
-              </a:rPr>
-              <a:t>: </a:t>
-            </a:r>
-          </a:p>
-          <a:p>
-            <a:r>
-              <a:rPr lang="en-US" sz="3700" b="1" dirty="0">
-                <a:latin typeface="Arial"/>
-                <a:ea typeface="+mn-lt"/>
-                <a:cs typeface="+mn-lt"/>
-              </a:rPr>
-              <a:t>Prediction: </a:t>
-            </a:r>
             <a:endParaRPr lang="en-US" sz="3700" dirty="0">
               <a:latin typeface="Arial"/>
               <a:ea typeface="+mn-lt"/>
@@ -3832,34 +3947,6 @@
             </a:endParaRPr>
           </a:p>
           <a:p>
-            <a:r>
-              <a:rPr lang="en-US" sz="3700" b="1" dirty="0">
-                <a:latin typeface="Arial"/>
-                <a:ea typeface="+mn-lt"/>
-                <a:cs typeface="+mn-lt"/>
-              </a:rPr>
-              <a:t>LDA</a:t>
-            </a:r>
-            <a:r>
-              <a:rPr lang="en-US" sz="3700" dirty="0">
-                <a:latin typeface="Arial"/>
-                <a:ea typeface="+mn-lt"/>
-                <a:cs typeface="+mn-lt"/>
-              </a:rPr>
-              <a:t>: </a:t>
-            </a:r>
-          </a:p>
-          <a:p>
-            <a:r>
-              <a:rPr lang="en-US" sz="3700" b="1" dirty="0">
-                <a:latin typeface="Arial"/>
-                <a:ea typeface="+mn-lt"/>
-                <a:cs typeface="+mn-lt"/>
-              </a:rPr>
-              <a:t>Prediction: </a:t>
-            </a:r>
-          </a:p>
-          <a:p>
             <a:endParaRPr lang="en-US" sz="3700" dirty="0">
               <a:latin typeface="Arial"/>
               <a:ea typeface="+mn-lt"/>
@@ -3874,32 +3961,18 @@
             </a:endParaRPr>
           </a:p>
           <a:p>
-            <a:r>
-              <a:rPr lang="en-US" sz="3700" b="1" dirty="0">
-                <a:latin typeface="Arial"/>
-                <a:ea typeface="+mn-lt"/>
-                <a:cs typeface="+mn-lt"/>
-              </a:rPr>
-              <a:t>Random Forest</a:t>
-            </a:r>
-            <a:r>
-              <a:rPr lang="en-US" sz="3700" dirty="0">
-                <a:latin typeface="Arial"/>
-                <a:ea typeface="+mn-lt"/>
-                <a:cs typeface="+mn-lt"/>
-              </a:rPr>
-              <a:t>: </a:t>
-            </a:r>
-          </a:p>
-          <a:p>
-            <a:r>
-              <a:rPr lang="en-US" sz="3700" b="1" dirty="0">
-                <a:latin typeface="Arial"/>
-                <a:ea typeface="+mn-lt"/>
-                <a:cs typeface="+mn-lt"/>
-              </a:rPr>
-              <a:t>Prediction: </a:t>
-            </a:r>
+            <a:endParaRPr lang="en-US" sz="3700" dirty="0">
+              <a:latin typeface="Arial"/>
+              <a:ea typeface="+mn-lt"/>
+              <a:cs typeface="+mn-lt"/>
+            </a:endParaRPr>
+          </a:p>
+          <a:p>
+            <a:endParaRPr lang="en-US" sz="3700" dirty="0">
+              <a:latin typeface="Arial"/>
+              <a:ea typeface="+mn-lt"/>
+              <a:cs typeface="+mn-lt"/>
+            </a:endParaRPr>
           </a:p>
           <a:p>
             <a:endParaRPr lang="en-US" sz="3700" dirty="0">
@@ -4241,10 +4314,10 @@
       </p:sp>
       <p:sp>
         <p:nvSpPr>
-          <p:cNvPr id="6" name="Text Placeholder 20">
+          <p:cNvPr id="7" name="Text Placeholder 20">
             <a:extLst>
               <a:ext uri="{FF2B5EF4-FFF2-40B4-BE49-F238E27FC236}">
-                <a16:creationId xmlns:a16="http://schemas.microsoft.com/office/drawing/2014/main" id="{818D63E3-4384-4A20-BBF8-75A2C3E5132E}"/>
+                <a16:creationId xmlns:a16="http://schemas.microsoft.com/office/drawing/2014/main" id="{699B39CF-910E-4A91-B9D4-92EB42DAA45D}"/>
               </a:ext>
             </a:extLst>
           </p:cNvPr>
@@ -4255,8 +4328,8 @@
         </p:nvSpPr>
         <p:spPr>
           <a:xfrm>
-            <a:off x="29378367" y="4453054"/>
-            <a:ext cx="13585370" cy="8686800"/>
+            <a:off x="29645466" y="4267200"/>
+            <a:ext cx="13800003" cy="14758320"/>
           </a:xfrm>
           <a:prstGeom prst="rect">
             <a:avLst/>
@@ -4402,222 +4475,142 @@
             </a:lvl9pPr>
           </a:lstStyle>
           <a:p>
-            <a:endParaRPr lang="en-US" sz="4200">
-              <a:cs typeface="Times New Roman"/>
-            </a:endParaRPr>
-          </a:p>
-        </p:txBody>
-      </p:sp>
-      <p:pic>
-        <p:nvPicPr>
-          <p:cNvPr id="8" name="Graphic 8">
-            <a:extLst>
-              <a:ext uri="{FF2B5EF4-FFF2-40B4-BE49-F238E27FC236}">
-                <a16:creationId xmlns:a16="http://schemas.microsoft.com/office/drawing/2014/main" id="{21412202-8FD3-4BE4-8327-E7932B8463A5}"/>
-              </a:ext>
-            </a:extLst>
-          </p:cNvPr>
-          <p:cNvPicPr>
-            <a:picLocks noChangeAspect="1"/>
-          </p:cNvPicPr>
-          <p:nvPr/>
-        </p:nvPicPr>
-        <p:blipFill>
-          <a:blip r:embed="rId5">
-            <a:extLst>
-              <a:ext uri="{96DAC541-7B7A-43D3-8B79-37D633B846F1}">
-                <asvg:svgBlip xmlns:asvg="http://schemas.microsoft.com/office/drawing/2016/SVG/main" r:embed="rId6"/>
-              </a:ext>
-            </a:extLst>
-          </a:blip>
-          <a:stretch>
-            <a:fillRect/>
-          </a:stretch>
-        </p:blipFill>
-        <p:spPr>
-          <a:xfrm>
-            <a:off x="30958015" y="9206448"/>
-            <a:ext cx="10397397" cy="8296507"/>
-          </a:xfrm>
-          <a:prstGeom prst="rect">
-            <a:avLst/>
-          </a:prstGeom>
-        </p:spPr>
-      </p:pic>
-      <p:sp>
-        <p:nvSpPr>
-          <p:cNvPr id="7" name="Text Placeholder 20">
-            <a:extLst>
-              <a:ext uri="{FF2B5EF4-FFF2-40B4-BE49-F238E27FC236}">
-                <a16:creationId xmlns:a16="http://schemas.microsoft.com/office/drawing/2014/main" id="{699B39CF-910E-4A91-B9D4-92EB42DAA45D}"/>
-              </a:ext>
-            </a:extLst>
-          </p:cNvPr>
-          <p:cNvSpPr txBox="1">
-            <a:spLocks/>
-          </p:cNvSpPr>
-          <p:nvPr/>
-        </p:nvSpPr>
-        <p:spPr>
-          <a:xfrm>
-            <a:off x="29619233" y="4185427"/>
-            <a:ext cx="13585370" cy="8820611"/>
-          </a:xfrm>
-          <a:prstGeom prst="rect">
-            <a:avLst/>
-          </a:prstGeom>
-        </p:spPr>
-        <p:txBody>
-          <a:bodyPr vert="horz" lIns="78373" tIns="39187" rIns="78373" bIns="39187" anchor="t"/>
-          <a:lstStyle>
-            <a:lvl1pPr marL="0" indent="0" algn="l" defTabSz="3493094" rtl="0" eaLnBrk="1" latinLnBrk="0" hangingPunct="1">
-              <a:spcBef>
-                <a:spcPct val="20000"/>
-              </a:spcBef>
-              <a:buFont typeface="Arial" pitchFamily="34" charset="0"/>
-              <a:buNone/>
-              <a:defRPr sz="2800" kern="1200" baseline="0">
-                <a:solidFill>
-                  <a:schemeClr val="tx1"/>
-                </a:solidFill>
-                <a:latin typeface="+mn-lt"/>
-                <a:ea typeface="+mn-ea"/>
-                <a:cs typeface="+mn-cs"/>
-              </a:defRPr>
-            </a:lvl1pPr>
-            <a:lvl2pPr marL="397308" indent="0" algn="l" defTabSz="3493094" rtl="0" eaLnBrk="1" latinLnBrk="0" hangingPunct="1">
-              <a:spcBef>
-                <a:spcPct val="20000"/>
-              </a:spcBef>
-              <a:buFont typeface="Arial" pitchFamily="34" charset="0"/>
-              <a:buNone/>
-              <a:defRPr sz="2800" kern="1200" baseline="0">
-                <a:solidFill>
-                  <a:schemeClr val="tx1"/>
-                </a:solidFill>
-                <a:latin typeface="+mn-lt"/>
-                <a:ea typeface="+mn-ea"/>
-                <a:cs typeface="+mn-cs"/>
-              </a:defRPr>
-            </a:lvl2pPr>
-            <a:lvl3pPr marL="772848" indent="0" algn="l" defTabSz="3493094" rtl="0" eaLnBrk="1" latinLnBrk="0" hangingPunct="1">
-              <a:spcBef>
-                <a:spcPct val="20000"/>
-              </a:spcBef>
-              <a:buFont typeface="Arial" pitchFamily="34" charset="0"/>
-              <a:buNone/>
-              <a:defRPr sz="2800" kern="1200" baseline="0">
-                <a:solidFill>
-                  <a:schemeClr val="tx1"/>
-                </a:solidFill>
-                <a:latin typeface="+mn-lt"/>
-                <a:ea typeface="+mn-ea"/>
-                <a:cs typeface="+mn-cs"/>
-              </a:defRPr>
-            </a:lvl3pPr>
-            <a:lvl4pPr marL="6112916" indent="-873274" algn="l" defTabSz="3493094" rtl="0" eaLnBrk="1" latinLnBrk="0" hangingPunct="1">
-              <a:spcBef>
-                <a:spcPct val="20000"/>
-              </a:spcBef>
-              <a:buFont typeface="Arial" pitchFamily="34" charset="0"/>
-              <a:buChar char="–"/>
-              <a:defRPr sz="2800" kern="1200">
-                <a:solidFill>
-                  <a:schemeClr val="tx1"/>
-                </a:solidFill>
-                <a:latin typeface="+mn-lt"/>
-                <a:ea typeface="+mn-ea"/>
-                <a:cs typeface="+mn-cs"/>
-              </a:defRPr>
-            </a:lvl4pPr>
-            <a:lvl5pPr marL="7859464" indent="-873274" algn="l" defTabSz="3493094" rtl="0" eaLnBrk="1" latinLnBrk="0" hangingPunct="1">
-              <a:spcBef>
-                <a:spcPct val="20000"/>
-              </a:spcBef>
-              <a:buFont typeface="Arial" pitchFamily="34" charset="0"/>
-              <a:buChar char="»"/>
-              <a:defRPr sz="2800" kern="1200">
-                <a:solidFill>
-                  <a:schemeClr val="tx1"/>
-                </a:solidFill>
-                <a:latin typeface="+mn-lt"/>
-                <a:ea typeface="+mn-ea"/>
-                <a:cs typeface="+mn-cs"/>
-              </a:defRPr>
-            </a:lvl5pPr>
-            <a:lvl6pPr marL="9606010" indent="-873274" algn="l" defTabSz="3493094" rtl="0" eaLnBrk="1" latinLnBrk="0" hangingPunct="1">
-              <a:spcBef>
-                <a:spcPct val="20000"/>
-              </a:spcBef>
-              <a:buFont typeface="Arial" pitchFamily="34" charset="0"/>
-              <a:buChar char="•"/>
-              <a:defRPr sz="7800" kern="1200">
-                <a:solidFill>
-                  <a:schemeClr val="tx1"/>
-                </a:solidFill>
-                <a:latin typeface="+mn-lt"/>
-                <a:ea typeface="+mn-ea"/>
-                <a:cs typeface="+mn-cs"/>
-              </a:defRPr>
-            </a:lvl6pPr>
-            <a:lvl7pPr marL="11352556" indent="-873274" algn="l" defTabSz="3493094" rtl="0" eaLnBrk="1" latinLnBrk="0" hangingPunct="1">
-              <a:spcBef>
-                <a:spcPct val="20000"/>
-              </a:spcBef>
-              <a:buFont typeface="Arial" pitchFamily="34" charset="0"/>
-              <a:buChar char="•"/>
-              <a:defRPr sz="7800" kern="1200">
-                <a:solidFill>
-                  <a:schemeClr val="tx1"/>
-                </a:solidFill>
-                <a:latin typeface="+mn-lt"/>
-                <a:ea typeface="+mn-ea"/>
-                <a:cs typeface="+mn-cs"/>
-              </a:defRPr>
-            </a:lvl7pPr>
-            <a:lvl8pPr marL="13099106" indent="-873274" algn="l" defTabSz="3493094" rtl="0" eaLnBrk="1" latinLnBrk="0" hangingPunct="1">
-              <a:spcBef>
-                <a:spcPct val="20000"/>
-              </a:spcBef>
-              <a:buFont typeface="Arial" pitchFamily="34" charset="0"/>
-              <a:buChar char="•"/>
-              <a:defRPr sz="7800" kern="1200">
-                <a:solidFill>
-                  <a:schemeClr val="tx1"/>
-                </a:solidFill>
-                <a:latin typeface="+mn-lt"/>
-                <a:ea typeface="+mn-ea"/>
-                <a:cs typeface="+mn-cs"/>
-              </a:defRPr>
-            </a:lvl8pPr>
-            <a:lvl9pPr marL="14845652" indent="-873274" algn="l" defTabSz="3493094" rtl="0" eaLnBrk="1" latinLnBrk="0" hangingPunct="1">
-              <a:spcBef>
-                <a:spcPct val="20000"/>
-              </a:spcBef>
-              <a:buFont typeface="Arial" pitchFamily="34" charset="0"/>
-              <a:buChar char="•"/>
-              <a:defRPr sz="7800" kern="1200">
-                <a:solidFill>
-                  <a:schemeClr val="tx1"/>
-                </a:solidFill>
-                <a:latin typeface="+mn-lt"/>
-                <a:ea typeface="+mn-ea"/>
-                <a:cs typeface="+mn-cs"/>
-              </a:defRPr>
-            </a:lvl9pPr>
-          </a:lstStyle>
+            <a:r>
+              <a:rPr lang="en-US" sz="3600" u="sng" dirty="0">
+                <a:latin typeface="Arial"/>
+                <a:cs typeface="Arial"/>
+              </a:rPr>
+              <a:t>Top 5 Predictors: </a:t>
+            </a:r>
+          </a:p>
+          <a:p>
+            <a:r>
+              <a:rPr lang="en-US" sz="3400" dirty="0">
+                <a:latin typeface="Arial"/>
+                <a:cs typeface="Arial"/>
+              </a:rPr>
+              <a:t>P49f: I feel confident about the future.	</a:t>
+            </a:r>
+          </a:p>
+          <a:p>
+            <a:r>
+              <a:rPr lang="en-US" sz="3400" dirty="0">
+                <a:latin typeface="Arial"/>
+                <a:cs typeface="Arial"/>
+              </a:rPr>
+              <a:t>P49l: I feel valued and appreciated by others.</a:t>
+            </a:r>
+          </a:p>
+          <a:p>
+            <a:r>
+              <a:rPr lang="en-US" sz="3400" dirty="0">
+                <a:latin typeface="Arial"/>
+                <a:cs typeface="Arial"/>
+              </a:rPr>
+              <a:t>P26a: Community or school offers sports teams </a:t>
+            </a:r>
+          </a:p>
+          <a:p>
+            <a:r>
+              <a:rPr lang="en-US" sz="3400" dirty="0">
+                <a:latin typeface="Arial"/>
+                <a:cs typeface="Arial"/>
+              </a:rPr>
+              <a:t>P45: Hours of Sleep</a:t>
+            </a:r>
+          </a:p>
+          <a:p>
+            <a:r>
+              <a:rPr lang="en-US" sz="3400" dirty="0">
+                <a:latin typeface="Arial"/>
+                <a:cs typeface="Arial"/>
+              </a:rPr>
+              <a:t>P37: Total minutes of physically activity</a:t>
+            </a:r>
+          </a:p>
+          <a:p>
+            <a:endParaRPr lang="en-US" sz="1000" b="1" dirty="0">
+              <a:latin typeface="Arial"/>
+              <a:cs typeface="Arial"/>
+            </a:endParaRPr>
+          </a:p>
           <a:p>
             <a:r>
               <a:rPr lang="en-US" sz="3700" b="1" dirty="0">
                 <a:latin typeface="Arial"/>
                 <a:cs typeface="Arial"/>
               </a:rPr>
-              <a:t>3. Predictions</a:t>
-            </a:r>
+              <a:t>Logistic Regression:</a:t>
+            </a:r>
+            <a:r>
+              <a:rPr lang="en-US" sz="3700" b="1" dirty="0">
+                <a:latin typeface="Arial"/>
+                <a:ea typeface="+mn-lt"/>
+                <a:cs typeface="+mn-lt"/>
+              </a:rPr>
+              <a:t> </a:t>
+            </a:r>
+            <a:r>
+              <a:rPr lang="en-US" sz="3600" dirty="0">
+                <a:latin typeface="Arial"/>
+                <a:ea typeface="+mn-lt"/>
+                <a:cs typeface="+mn-lt"/>
+              </a:rPr>
+              <a:t>LR were built using all 126 predictors, 20 of the most important predictors, 5 of the most important predictor variables, and 1 important predictor that were identified in the Random Forest. </a:t>
+            </a:r>
+          </a:p>
+          <a:p>
             <a:endParaRPr lang="en-US" sz="3700" dirty="0">
               <a:latin typeface="Arial"/>
-              <a:ea typeface="+mn-lt"/>
-              <a:cs typeface="+mn-lt"/>
+              <a:cs typeface="Arial"/>
+            </a:endParaRPr>
+          </a:p>
+          <a:p>
+            <a:endParaRPr lang="en-US" sz="3700" dirty="0">
+              <a:latin typeface="Arial"/>
+              <a:cs typeface="Arial"/>
+            </a:endParaRPr>
+          </a:p>
+          <a:p>
+            <a:endParaRPr lang="en-US" sz="3700" dirty="0">
+              <a:latin typeface="Arial"/>
+              <a:cs typeface="Arial"/>
+            </a:endParaRPr>
+          </a:p>
+          <a:p>
+            <a:endParaRPr lang="en-US" sz="3700" dirty="0">
+              <a:latin typeface="Arial"/>
+              <a:cs typeface="Arial"/>
+            </a:endParaRPr>
+          </a:p>
+          <a:p>
+            <a:endParaRPr lang="en-US" sz="3700" dirty="0">
+              <a:latin typeface="Arial"/>
+              <a:cs typeface="Arial"/>
+            </a:endParaRPr>
+          </a:p>
+          <a:p>
+            <a:endParaRPr lang="en-US" sz="3700" dirty="0">
+              <a:latin typeface="Arial"/>
+              <a:cs typeface="Arial"/>
+            </a:endParaRPr>
+          </a:p>
+          <a:p>
+            <a:endParaRPr lang="en-US" sz="700" b="1" dirty="0">
+              <a:latin typeface="Arial"/>
+              <a:cs typeface="Arial"/>
+            </a:endParaRPr>
+          </a:p>
+          <a:p>
+            <a:endParaRPr lang="en-US" sz="1000" b="1" dirty="0">
+              <a:latin typeface="Arial"/>
+              <a:cs typeface="Arial"/>
+            </a:endParaRPr>
+          </a:p>
+          <a:p>
+            <a:endParaRPr lang="en-US" sz="1000" b="1" dirty="0">
+              <a:latin typeface="Arial"/>
+              <a:cs typeface="Arial"/>
             </a:endParaRPr>
           </a:p>
           <a:p>
@@ -4626,56 +4619,20 @@
                 <a:latin typeface="Arial"/>
                 <a:cs typeface="Arial"/>
               </a:rPr>
-              <a:t>Problem</a:t>
+              <a:t>LDA: </a:t>
             </a:r>
             <a:r>
               <a:rPr lang="en-US" sz="3700" dirty="0">
                 <a:latin typeface="Arial"/>
                 <a:cs typeface="Arial"/>
               </a:rPr>
-              <a:t>: </a:t>
-            </a:r>
-            <a:r>
-              <a:rPr lang="en-US" sz="3700" dirty="0" err="1">
-                <a:latin typeface="Arial"/>
-                <a:cs typeface="Arial"/>
-              </a:rPr>
-              <a:t>CovIdentify's</a:t>
-            </a:r>
-            <a:r>
-              <a:rPr lang="en-US" sz="3700" dirty="0">
-                <a:latin typeface="Arial"/>
-                <a:cs typeface="Arial"/>
-              </a:rPr>
-              <a:t> smartwatch data currently unassessed in terms of users’ daily and inter-day adherence to recording data and is thus incomparable to other studies. </a:t>
-            </a:r>
-          </a:p>
-          <a:p>
-            <a:r>
-              <a:rPr lang="en-US" sz="3700" b="1" dirty="0">
-                <a:latin typeface="Arial"/>
-                <a:cs typeface="Arial"/>
-              </a:rPr>
-              <a:t>Solution</a:t>
-            </a:r>
-            <a:r>
-              <a:rPr lang="en-US" sz="3700" dirty="0">
-                <a:latin typeface="Arial"/>
-                <a:cs typeface="Arial"/>
-              </a:rPr>
-              <a:t>: Created SQL scripts to subset data by users’ adherence to devices. Can now set and monitor thresholds for minimum recording adherence for daily and inter-day timespans. </a:t>
-            </a:r>
-            <a:r>
-              <a:rPr lang="en-US" sz="3700" dirty="0">
-                <a:latin typeface="Arial"/>
-                <a:ea typeface="Times New Roman"/>
-                <a:cs typeface="Times New Roman"/>
-              </a:rPr>
-              <a:t>​</a:t>
-            </a:r>
+              <a:t>LDA identified 40 predictors that would best classify students into good or fair SPH. Utilizing the algorithms most accurate cutoff LDA produced a ROC curve of 72.2% and an accuracy rate of 75.6%. </a:t>
+            </a:r>
+          </a:p>
+          <a:p>
             <a:endParaRPr lang="en-US" sz="3700" dirty="0">
               <a:latin typeface="Arial"/>
-              <a:cs typeface="Times New Roman"/>
+              <a:cs typeface="Arial"/>
             </a:endParaRPr>
           </a:p>
         </p:txBody>
@@ -4694,8 +4651,8 @@
         </p:nvSpPr>
         <p:spPr>
           <a:xfrm>
-            <a:off x="29619869" y="17461692"/>
-            <a:ext cx="13127216" cy="1384995"/>
+            <a:off x="30067299" y="14425598"/>
+            <a:ext cx="13127216" cy="523220"/>
           </a:xfrm>
           <a:prstGeom prst="rect">
             <a:avLst/>
@@ -4717,7 +4674,7 @@
                 <a:ea typeface="+mn-lt"/>
                 <a:cs typeface="+mn-lt"/>
               </a:rPr>
-              <a:t>For four thresholds (2, 4, 6, and 8 hours), the number of days with data collected for longer than threshold is calculated for five selected participants.  </a:t>
+              <a:t>Table 1. Breakdown of LR model results. </a:t>
             </a:r>
             <a:endParaRPr lang="en-US" sz="2800" dirty="0">
               <a:latin typeface="Arial"/>
@@ -4740,7 +4697,7 @@
           <p:nvPr/>
         </p:nvPicPr>
         <p:blipFill>
-          <a:blip r:embed="rId7">
+          <a:blip r:embed="rId6">
             <a:extLst>
               <a:ext uri="{28A0092B-C50C-407E-A947-70E740481C1C}">
                 <a14:useLocalDpi xmlns:a14="http://schemas.microsoft.com/office/drawing/2010/main" val="0"/>
@@ -4994,7 +4951,7 @@
         </p:nvSpPr>
         <p:spPr>
           <a:xfrm>
-            <a:off x="710175" y="15694978"/>
+            <a:off x="696687" y="15639557"/>
             <a:ext cx="13585370" cy="5198754"/>
           </a:xfrm>
           <a:prstGeom prst="rect">
@@ -5153,7 +5110,28 @@
                 <a:latin typeface="Arial" panose="020B0604020202020204" pitchFamily="34" charset="0"/>
                 <a:cs typeface="Arial" panose="020B0604020202020204" pitchFamily="34" charset="0"/>
               </a:rPr>
-              <a:t>The Minnesota Student Survey is one of the longest-running youth surveys in the U.S. and it is administered every three years to middle and high school students (81% participation rate).</a:t>
+              <a:t>The Minnesota Student Survey is one of the longest-running youth surveys in the U.S. and it is administered every three years to middle and high school students (81% participation rate) [</a:t>
+            </a:r>
+            <a:r>
+              <a:rPr lang="en-US" sz="3600" dirty="0">
+                <a:solidFill>
+                  <a:srgbClr val="000000"/>
+                </a:solidFill>
+                <a:latin typeface="Arial" panose="020B0604020202020204" pitchFamily="34" charset="0"/>
+                <a:cs typeface="Arial" panose="020B0604020202020204" pitchFamily="34" charset="0"/>
+              </a:rPr>
+              <a:t>4</a:t>
+            </a:r>
+            <a:r>
+              <a:rPr lang="en-US" sz="3600" b="0" i="0" dirty="0">
+                <a:solidFill>
+                  <a:srgbClr val="000000"/>
+                </a:solidFill>
+                <a:effectLst/>
+                <a:latin typeface="Arial" panose="020B0604020202020204" pitchFamily="34" charset="0"/>
+                <a:cs typeface="Arial" panose="020B0604020202020204" pitchFamily="34" charset="0"/>
+              </a:rPr>
+              <a:t>].</a:t>
             </a:r>
             <a:r>
               <a:rPr lang="en-US" sz="3600" dirty="0">
@@ -5249,8 +5227,8 @@
         </p:nvSpPr>
         <p:spPr>
           <a:xfrm>
-            <a:off x="15611071" y="21172572"/>
-            <a:ext cx="13127216" cy="1815882"/>
+            <a:off x="15126684" y="20353637"/>
+            <a:ext cx="13556308" cy="1384995"/>
           </a:xfrm>
           <a:prstGeom prst="rect">
             <a:avLst/>
@@ -5275,7 +5253,7 @@
                 <a:latin typeface="Arial" panose="020B0604020202020204" pitchFamily="34" charset="0"/>
                 <a:cs typeface="Arial" panose="020B0604020202020204" pitchFamily="34" charset="0"/>
               </a:rPr>
-              <a:t>Figure 2: Psychological health clustering results by self-perceived health dichotomized (left) and on the five-point scale (right). The plot on the right shows the clustering groups are more accurate for more extreme values of self-perceived health.</a:t>
+              <a:t>Figure 1: Psychological health clustering results by SPH dichotomized (left) and on the five-point scale (right). The plot on the right shows the clustering groups are more accurate for more extreme values of self-perceived health.</a:t>
             </a:r>
             <a:endParaRPr lang="en-US" sz="2800" b="1" dirty="0">
               <a:latin typeface="Arial" panose="020B0604020202020204" pitchFamily="34" charset="0"/>
@@ -5286,15 +5264,50 @@
       </p:sp>
       <p:pic>
         <p:nvPicPr>
-          <p:cNvPr id="1028" name="Picture 4">
+          <p:cNvPr id="38" name="Picture 37" descr="Chart, bar chart&#10;&#10;Description automatically generated">
             <a:extLst>
               <a:ext uri="{FF2B5EF4-FFF2-40B4-BE49-F238E27FC236}">
-                <a16:creationId xmlns:a16="http://schemas.microsoft.com/office/drawing/2014/main" id="{DDD09E62-BF29-1C0E-913E-74AB701A2C9D}"/>
+                <a16:creationId xmlns:a16="http://schemas.microsoft.com/office/drawing/2014/main" id="{551AD4B7-C981-B406-4792-EEE33F0F205F}"/>
               </a:ext>
             </a:extLst>
           </p:cNvPr>
           <p:cNvPicPr>
-            <a:picLocks noChangeAspect="1" noChangeArrowheads="1"/>
+            <a:picLocks noChangeAspect="1"/>
+          </p:cNvPicPr>
+          <p:nvPr/>
+        </p:nvPicPr>
+        <p:blipFill rotWithShape="1">
+          <a:blip r:embed="rId7">
+            <a:extLst>
+              <a:ext uri="{28A0092B-C50C-407E-A947-70E740481C1C}">
+                <a14:useLocalDpi xmlns:a14="http://schemas.microsoft.com/office/drawing/2010/main" val="0"/>
+              </a:ext>
+            </a:extLst>
+          </a:blip>
+          <a:srcRect t="4977" r="29816"/>
+          <a:stretch/>
+        </p:blipFill>
+        <p:spPr>
+          <a:xfrm>
+            <a:off x="14912051" y="12198976"/>
+            <a:ext cx="6030262" cy="8164322"/>
+          </a:xfrm>
+          <a:prstGeom prst="rect">
+            <a:avLst/>
+          </a:prstGeom>
+        </p:spPr>
+      </p:pic>
+      <p:pic>
+        <p:nvPicPr>
+          <p:cNvPr id="40" name="Picture 39" descr="Chart, treemap chart&#10;&#10;Description automatically generated">
+            <a:extLst>
+              <a:ext uri="{FF2B5EF4-FFF2-40B4-BE49-F238E27FC236}">
+                <a16:creationId xmlns:a16="http://schemas.microsoft.com/office/drawing/2014/main" id="{CA8FB25E-2BD4-9315-0FB1-0A25F05DC1AF}"/>
+              </a:ext>
+            </a:extLst>
+          </p:cNvPr>
+          <p:cNvPicPr>
+            <a:picLocks noChangeAspect="1"/>
           </p:cNvPicPr>
           <p:nvPr/>
         </p:nvPicPr>
@@ -5306,80 +5319,120 @@
               </a:ext>
             </a:extLst>
           </a:blip>
-          <a:srcRect l="1623" t="3067" r="58397" b="2875"/>
+          <a:srcRect t="4977"/>
           <a:stretch/>
         </p:blipFill>
-        <p:spPr bwMode="auto">
+        <p:spPr>
           <a:xfrm>
-            <a:off x="15965473" y="12800118"/>
-            <a:ext cx="5406675" cy="7839053"/>
+            <a:off x="21027246" y="12198976"/>
+            <a:ext cx="8591987" cy="8164322"/>
+          </a:xfrm>
+          <a:prstGeom prst="rect">
+            <a:avLst/>
+          </a:prstGeom>
+        </p:spPr>
+      </p:pic>
+      <p:sp>
+        <p:nvSpPr>
+          <p:cNvPr id="42" name="TextBox 41">
+            <a:extLst>
+              <a:ext uri="{FF2B5EF4-FFF2-40B4-BE49-F238E27FC236}">
+                <a16:creationId xmlns:a16="http://schemas.microsoft.com/office/drawing/2014/main" id="{CDA231EF-B3FB-6773-F4E4-7C3603ECC3B9}"/>
+              </a:ext>
+            </a:extLst>
+          </p:cNvPr>
+          <p:cNvSpPr txBox="1"/>
+          <p:nvPr/>
+        </p:nvSpPr>
+        <p:spPr>
+          <a:xfrm>
+            <a:off x="15618328" y="11804543"/>
+            <a:ext cx="11635872" cy="523220"/>
           </a:xfrm>
           <a:prstGeom prst="rect">
             <a:avLst/>
           </a:prstGeom>
           <a:noFill/>
-          <a:extLst>
-            <a:ext uri="{909E8E84-426E-40DD-AFC4-6F175D3DCCD1}">
-              <a14:hiddenFill xmlns:a14="http://schemas.microsoft.com/office/drawing/2010/main">
+        </p:spPr>
+        <p:txBody>
+          <a:bodyPr wrap="square">
+            <a:spAutoFit/>
+          </a:bodyPr>
+          <a:lstStyle/>
+          <a:p>
+            <a:r>
+              <a:rPr lang="en-US" sz="2700" i="0" dirty="0">
                 <a:solidFill>
-                  <a:srgbClr val="FFFFFF"/>
+                  <a:srgbClr val="000000"/>
                 </a:solidFill>
-              </a14:hiddenFill>
-            </a:ext>
-          </a:extLst>
-        </p:spPr>
-      </p:pic>
-      <p:pic>
-        <p:nvPicPr>
-          <p:cNvPr id="10" name="Picture 4">
+                <a:effectLst/>
+                <a:latin typeface="Arial" panose="020B0604020202020204" pitchFamily="34" charset="0"/>
+                <a:cs typeface="Arial" panose="020B0604020202020204" pitchFamily="34" charset="0"/>
+              </a:rPr>
+              <a:t>Prop. Psychological Health Cluster in Self-Perceived Health Groups</a:t>
+            </a:r>
+            <a:endParaRPr lang="en-US" sz="2700" dirty="0"/>
+          </a:p>
+        </p:txBody>
+      </p:sp>
+      <p:sp>
+        <p:nvSpPr>
+          <p:cNvPr id="16" name="Rectangle 15">
             <a:extLst>
               <a:ext uri="{FF2B5EF4-FFF2-40B4-BE49-F238E27FC236}">
-                <a16:creationId xmlns:a16="http://schemas.microsoft.com/office/drawing/2014/main" id="{24BC0295-3042-8CC1-9621-E8502217371E}"/>
+                <a16:creationId xmlns:a16="http://schemas.microsoft.com/office/drawing/2014/main" id="{C20ABE28-A593-6390-AD78-29AC1573E79E}"/>
               </a:ext>
             </a:extLst>
           </p:cNvPr>
-          <p:cNvPicPr>
-            <a:picLocks noChangeAspect="1" noChangeArrowheads="1"/>
-          </p:cNvPicPr>
+          <p:cNvSpPr/>
           <p:nvPr/>
-        </p:nvPicPr>
-        <p:blipFill rotWithShape="1">
-          <a:blip r:embed="rId8">
-            <a:extLst>
-              <a:ext uri="{28A0092B-C50C-407E-A947-70E740481C1C}">
-                <a14:useLocalDpi xmlns:a14="http://schemas.microsoft.com/office/drawing/2010/main" val="0"/>
-              </a:ext>
-            </a:extLst>
-          </a:blip>
-          <a:srcRect l="51715" t="3067" r="9000" b="2541"/>
-          <a:stretch/>
-        </p:blipFill>
-        <p:spPr bwMode="auto">
+        </p:nvSpPr>
+        <p:spPr>
           <a:xfrm>
-            <a:off x="22157929" y="12772238"/>
-            <a:ext cx="5312781" cy="7866934"/>
+            <a:off x="39670892" y="32148222"/>
+            <a:ext cx="4220308" cy="770178"/>
           </a:xfrm>
           <a:prstGeom prst="rect">
             <a:avLst/>
           </a:prstGeom>
-          <a:noFill/>
-          <a:extLst>
-            <a:ext uri="{909E8E84-426E-40DD-AFC4-6F175D3DCCD1}">
-              <a14:hiddenFill xmlns:a14="http://schemas.microsoft.com/office/drawing/2010/main">
-                <a:solidFill>
-                  <a:srgbClr val="FFFFFF"/>
-                </a:solidFill>
-              </a14:hiddenFill>
-            </a:ext>
-          </a:extLst>
+          <a:solidFill>
+            <a:schemeClr val="bg1"/>
+          </a:solidFill>
+          <a:ln>
+            <a:noFill/>
+          </a:ln>
         </p:spPr>
-      </p:pic>
+        <p:style>
+          <a:lnRef idx="2">
+            <a:schemeClr val="accent1">
+              <a:shade val="50000"/>
+            </a:schemeClr>
+          </a:lnRef>
+          <a:fillRef idx="1">
+            <a:schemeClr val="accent1"/>
+          </a:fillRef>
+          <a:effectRef idx="0">
+            <a:schemeClr val="accent1"/>
+          </a:effectRef>
+          <a:fontRef idx="minor">
+            <a:schemeClr val="lt1"/>
+          </a:fontRef>
+        </p:style>
+        <p:txBody>
+          <a:bodyPr rtlCol="0" anchor="ctr"/>
+          <a:lstStyle/>
+          <a:p>
+            <a:pPr algn="ctr"/>
+            <a:endParaRPr lang="en-US"/>
+          </a:p>
+        </p:txBody>
+      </p:sp>
       <p:pic>
         <p:nvPicPr>
-          <p:cNvPr id="17" name="Picture 16">
+          <p:cNvPr id="37" name="Picture 36" descr="Diagram&#10;&#10;Description automatically generated">
             <a:extLst>
               <a:ext uri="{FF2B5EF4-FFF2-40B4-BE49-F238E27FC236}">
-                <a16:creationId xmlns:a16="http://schemas.microsoft.com/office/drawing/2014/main" id="{624A0C77-45C4-BB8A-39A5-772B609A3164}"/>
+                <a16:creationId xmlns:a16="http://schemas.microsoft.com/office/drawing/2014/main" id="{E33D7BE0-48FC-B7DA-388C-166C18ED38D4}"/>
               </a:ext>
             </a:extLst>
           </p:cNvPr>
@@ -5396,19 +5449,714 @@
               </a:ext>
             </a:extLst>
           </a:blip>
-          <a:srcRect l="1495" t="3884" r="38797" b="9027"/>
+          <a:srcRect l="1639" t="3957" r="38516" b="9540"/>
           <a:stretch/>
         </p:blipFill>
         <p:spPr>
           <a:xfrm>
-            <a:off x="3051352" y="22453006"/>
-            <a:ext cx="9144000" cy="10003043"/>
+            <a:off x="2632404" y="22247318"/>
+            <a:ext cx="9524697" cy="10317039"/>
           </a:xfrm>
           <a:prstGeom prst="rect">
             <a:avLst/>
           </a:prstGeom>
         </p:spPr>
       </p:pic>
+      <p:graphicFrame>
+        <p:nvGraphicFramePr>
+          <p:cNvPr id="39" name="Table 32">
+            <a:extLst>
+              <a:ext uri="{FF2B5EF4-FFF2-40B4-BE49-F238E27FC236}">
+                <a16:creationId xmlns:a16="http://schemas.microsoft.com/office/drawing/2014/main" id="{1FF9E2B0-D3A0-A0A0-B7D0-DD13245C004F}"/>
+              </a:ext>
+            </a:extLst>
+          </p:cNvPr>
+          <p:cNvGraphicFramePr>
+            <a:graphicFrameLocks noGrp="1"/>
+          </p:cNvGraphicFramePr>
+          <p:nvPr>
+            <p:extLst>
+              <p:ext uri="{D42A27DB-BD31-4B8C-83A1-F6EECF244321}">
+                <p14:modId xmlns:p14="http://schemas.microsoft.com/office/powerpoint/2010/main" val="1820331786"/>
+              </p:ext>
+            </p:extLst>
+          </p:nvPr>
+        </p:nvGraphicFramePr>
+        <p:xfrm>
+          <a:off x="30130085" y="10743706"/>
+          <a:ext cx="12081933" cy="3638702"/>
+        </p:xfrm>
+        <a:graphic>
+          <a:graphicData uri="http://schemas.openxmlformats.org/drawingml/2006/table">
+            <a:tbl>
+              <a:tblPr firstRow="1" bandRow="1">
+                <a:tableStyleId>{5C22544A-7EE6-4342-B048-85BDC9FD1C3A}</a:tableStyleId>
+              </a:tblPr>
+              <a:tblGrid>
+                <a:gridCol w="3277822">
+                  <a:extLst>
+                    <a:ext uri="{9D8B030D-6E8A-4147-A177-3AD203B41FA5}">
+                      <a16:colId xmlns:a16="http://schemas.microsoft.com/office/drawing/2014/main" val="35782900"/>
+                    </a:ext>
+                  </a:extLst>
+                </a:gridCol>
+                <a:gridCol w="2921468">
+                  <a:extLst>
+                    <a:ext uri="{9D8B030D-6E8A-4147-A177-3AD203B41FA5}">
+                      <a16:colId xmlns:a16="http://schemas.microsoft.com/office/drawing/2014/main" val="2326338913"/>
+                    </a:ext>
+                  </a:extLst>
+                </a:gridCol>
+                <a:gridCol w="3178273">
+                  <a:extLst>
+                    <a:ext uri="{9D8B030D-6E8A-4147-A177-3AD203B41FA5}">
+                      <a16:colId xmlns:a16="http://schemas.microsoft.com/office/drawing/2014/main" val="1673451824"/>
+                    </a:ext>
+                  </a:extLst>
+                </a:gridCol>
+                <a:gridCol w="2704370">
+                  <a:extLst>
+                    <a:ext uri="{9D8B030D-6E8A-4147-A177-3AD203B41FA5}">
+                      <a16:colId xmlns:a16="http://schemas.microsoft.com/office/drawing/2014/main" val="861938138"/>
+                    </a:ext>
+                  </a:extLst>
+                </a:gridCol>
+              </a:tblGrid>
+              <a:tr h="370840">
+                <a:tc>
+                  <a:txBody>
+                    <a:bodyPr/>
+                    <a:lstStyle/>
+                    <a:p>
+                      <a:pPr algn="r"/>
+                      <a:endParaRPr lang="en-US" sz="3200" dirty="0">
+                        <a:latin typeface="Arial" panose="020B0604020202020204" pitchFamily="34" charset="0"/>
+                        <a:cs typeface="Arial" panose="020B0604020202020204" pitchFamily="34" charset="0"/>
+                      </a:endParaRPr>
+                    </a:p>
+                  </a:txBody>
+                  <a:tcPr anchor="ctr"/>
+                </a:tc>
+                <a:tc>
+                  <a:txBody>
+                    <a:bodyPr/>
+                    <a:lstStyle/>
+                    <a:p>
+                      <a:pPr algn="ctr"/>
+                      <a:r>
+                        <a:rPr lang="en-US" sz="3200" b="1" dirty="0">
+                          <a:solidFill>
+                            <a:schemeClr val="bg1"/>
+                          </a:solidFill>
+                          <a:latin typeface="Arial" panose="020B0604020202020204" pitchFamily="34" charset="0"/>
+                          <a:cs typeface="Arial" panose="020B0604020202020204" pitchFamily="34" charset="0"/>
+                        </a:rPr>
+                        <a:t>Accuracy</a:t>
+                      </a:r>
+                    </a:p>
+                  </a:txBody>
+                  <a:tcPr anchor="ctr"/>
+                </a:tc>
+                <a:tc>
+                  <a:txBody>
+                    <a:bodyPr/>
+                    <a:lstStyle/>
+                    <a:p>
+                      <a:pPr algn="ctr"/>
+                      <a:r>
+                        <a:rPr lang="en-US" sz="3200" b="1" dirty="0">
+                          <a:solidFill>
+                            <a:schemeClr val="bg1"/>
+                          </a:solidFill>
+                          <a:latin typeface="Arial" panose="020B0604020202020204" pitchFamily="34" charset="0"/>
+                          <a:cs typeface="Arial" panose="020B0604020202020204" pitchFamily="34" charset="0"/>
+                        </a:rPr>
+                        <a:t>Sensitivity</a:t>
+                      </a:r>
+                    </a:p>
+                  </a:txBody>
+                  <a:tcPr anchor="ctr"/>
+                </a:tc>
+                <a:tc>
+                  <a:txBody>
+                    <a:bodyPr/>
+                    <a:lstStyle/>
+                    <a:p>
+                      <a:pPr algn="ctr"/>
+                      <a:r>
+                        <a:rPr lang="en-US" sz="3200" b="1" dirty="0">
+                          <a:solidFill>
+                            <a:schemeClr val="bg1"/>
+                          </a:solidFill>
+                          <a:latin typeface="Arial" panose="020B0604020202020204" pitchFamily="34" charset="0"/>
+                          <a:cs typeface="Arial" panose="020B0604020202020204" pitchFamily="34" charset="0"/>
+                        </a:rPr>
+                        <a:t>Specificity</a:t>
+                      </a:r>
+                    </a:p>
+                  </a:txBody>
+                  <a:tcPr anchor="ctr"/>
+                </a:tc>
+                <a:extLst>
+                  <a:ext uri="{0D108BD9-81ED-4DB2-BD59-A6C34878D82A}">
+                    <a16:rowId xmlns:a16="http://schemas.microsoft.com/office/drawing/2014/main" val="3905098576"/>
+                  </a:ext>
+                </a:extLst>
+              </a:tr>
+              <a:tr h="661111">
+                <a:tc>
+                  <a:txBody>
+                    <a:bodyPr/>
+                    <a:lstStyle/>
+                    <a:p>
+                      <a:pPr algn="l"/>
+                      <a:r>
+                        <a:rPr lang="en-US" sz="3200" b="1" dirty="0">
+                          <a:latin typeface="Arial" panose="020B0604020202020204" pitchFamily="34" charset="0"/>
+                          <a:cs typeface="Arial" panose="020B0604020202020204" pitchFamily="34" charset="0"/>
+                        </a:rPr>
+                        <a:t>126 Predictors</a:t>
+                      </a:r>
+                    </a:p>
+                  </a:txBody>
+                  <a:tcPr anchor="ctr"/>
+                </a:tc>
+                <a:tc>
+                  <a:txBody>
+                    <a:bodyPr/>
+                    <a:lstStyle/>
+                    <a:p>
+                      <a:pPr algn="ctr"/>
+                      <a:r>
+                        <a:rPr lang="en-US" sz="3200" dirty="0">
+                          <a:latin typeface="Arial" panose="020B0604020202020204" pitchFamily="34" charset="0"/>
+                          <a:cs typeface="Arial" panose="020B0604020202020204" pitchFamily="34" charset="0"/>
+                        </a:rPr>
+                        <a:t>76.1%</a:t>
+                      </a:r>
+                    </a:p>
+                  </a:txBody>
+                  <a:tcPr anchor="ctr"/>
+                </a:tc>
+                <a:tc>
+                  <a:txBody>
+                    <a:bodyPr/>
+                    <a:lstStyle/>
+                    <a:p>
+                      <a:pPr algn="ctr"/>
+                      <a:r>
+                        <a:rPr lang="en-US" sz="3200" dirty="0">
+                          <a:latin typeface="Arial" panose="020B0604020202020204" pitchFamily="34" charset="0"/>
+                          <a:cs typeface="Arial" panose="020B0604020202020204" pitchFamily="34" charset="0"/>
+                        </a:rPr>
+                        <a:t>59.9%</a:t>
+                      </a:r>
+                    </a:p>
+                  </a:txBody>
+                  <a:tcPr anchor="ctr"/>
+                </a:tc>
+                <a:tc>
+                  <a:txBody>
+                    <a:bodyPr/>
+                    <a:lstStyle/>
+                    <a:p>
+                      <a:pPr algn="ctr"/>
+                      <a:r>
+                        <a:rPr lang="en-US" sz="3200" dirty="0">
+                          <a:latin typeface="Arial" panose="020B0604020202020204" pitchFamily="34" charset="0"/>
+                          <a:cs typeface="Arial" panose="020B0604020202020204" pitchFamily="34" charset="0"/>
+                        </a:rPr>
+                        <a:t>85.3%</a:t>
+                      </a:r>
+                    </a:p>
+                  </a:txBody>
+                  <a:tcPr anchor="ctr"/>
+                </a:tc>
+                <a:extLst>
+                  <a:ext uri="{0D108BD9-81ED-4DB2-BD59-A6C34878D82A}">
+                    <a16:rowId xmlns:a16="http://schemas.microsoft.com/office/drawing/2014/main" val="1776449090"/>
+                  </a:ext>
+                </a:extLst>
+              </a:tr>
+              <a:tr h="661111">
+                <a:tc>
+                  <a:txBody>
+                    <a:bodyPr/>
+                    <a:lstStyle/>
+                    <a:p>
+                      <a:pPr algn="l"/>
+                      <a:r>
+                        <a:rPr lang="en-US" sz="3200" b="1" dirty="0">
+                          <a:latin typeface="Arial" panose="020B0604020202020204" pitchFamily="34" charset="0"/>
+                          <a:cs typeface="Arial" panose="020B0604020202020204" pitchFamily="34" charset="0"/>
+                        </a:rPr>
+                        <a:t>20 Predictors</a:t>
+                      </a:r>
+                    </a:p>
+                  </a:txBody>
+                  <a:tcPr anchor="ctr"/>
+                </a:tc>
+                <a:tc>
+                  <a:txBody>
+                    <a:bodyPr/>
+                    <a:lstStyle/>
+                    <a:p>
+                      <a:pPr algn="ctr"/>
+                      <a:r>
+                        <a:rPr lang="en-US" sz="3200" dirty="0">
+                          <a:latin typeface="Arial" panose="020B0604020202020204" pitchFamily="34" charset="0"/>
+                          <a:cs typeface="Arial" panose="020B0604020202020204" pitchFamily="34" charset="0"/>
+                        </a:rPr>
+                        <a:t>75.0%</a:t>
+                      </a:r>
+                    </a:p>
+                  </a:txBody>
+                  <a:tcPr anchor="ctr"/>
+                </a:tc>
+                <a:tc>
+                  <a:txBody>
+                    <a:bodyPr/>
+                    <a:lstStyle/>
+                    <a:p>
+                      <a:pPr algn="ctr"/>
+                      <a:r>
+                        <a:rPr lang="en-US" sz="3200" dirty="0">
+                          <a:latin typeface="Arial" panose="020B0604020202020204" pitchFamily="34" charset="0"/>
+                          <a:cs typeface="Arial" panose="020B0604020202020204" pitchFamily="34" charset="0"/>
+                        </a:rPr>
+                        <a:t>57.9%</a:t>
+                      </a:r>
+                    </a:p>
+                  </a:txBody>
+                  <a:tcPr anchor="ctr"/>
+                </a:tc>
+                <a:tc>
+                  <a:txBody>
+                    <a:bodyPr/>
+                    <a:lstStyle/>
+                    <a:p>
+                      <a:pPr algn="ctr"/>
+                      <a:r>
+                        <a:rPr lang="en-US" sz="3200" dirty="0">
+                          <a:latin typeface="Arial" panose="020B0604020202020204" pitchFamily="34" charset="0"/>
+                          <a:cs typeface="Arial" panose="020B0604020202020204" pitchFamily="34" charset="0"/>
+                        </a:rPr>
+                        <a:t>84.8%</a:t>
+                      </a:r>
+                    </a:p>
+                  </a:txBody>
+                  <a:tcPr anchor="ctr"/>
+                </a:tc>
+                <a:extLst>
+                  <a:ext uri="{0D108BD9-81ED-4DB2-BD59-A6C34878D82A}">
+                    <a16:rowId xmlns:a16="http://schemas.microsoft.com/office/drawing/2014/main" val="716548440"/>
+                  </a:ext>
+                </a:extLst>
+              </a:tr>
+              <a:tr h="370840">
+                <a:tc>
+                  <a:txBody>
+                    <a:bodyPr/>
+                    <a:lstStyle/>
+                    <a:p>
+                      <a:pPr algn="l"/>
+                      <a:r>
+                        <a:rPr lang="en-US" sz="3200" b="1" dirty="0">
+                          <a:latin typeface="Arial" panose="020B0604020202020204" pitchFamily="34" charset="0"/>
+                          <a:cs typeface="Arial" panose="020B0604020202020204" pitchFamily="34" charset="0"/>
+                        </a:rPr>
+                        <a:t>5 Predictors</a:t>
+                      </a:r>
+                    </a:p>
+                  </a:txBody>
+                  <a:tcPr anchor="ctr"/>
+                </a:tc>
+                <a:tc>
+                  <a:txBody>
+                    <a:bodyPr/>
+                    <a:lstStyle/>
+                    <a:p>
+                      <a:pPr algn="ctr"/>
+                      <a:r>
+                        <a:rPr lang="en-US" sz="3200" dirty="0">
+                          <a:latin typeface="Arial" panose="020B0604020202020204" pitchFamily="34" charset="0"/>
+                          <a:cs typeface="Arial" panose="020B0604020202020204" pitchFamily="34" charset="0"/>
+                        </a:rPr>
+                        <a:t>70.2%</a:t>
+                      </a:r>
+                    </a:p>
+                  </a:txBody>
+                  <a:tcPr anchor="ctr"/>
+                </a:tc>
+                <a:tc>
+                  <a:txBody>
+                    <a:bodyPr/>
+                    <a:lstStyle/>
+                    <a:p>
+                      <a:pPr algn="ctr"/>
+                      <a:r>
+                        <a:rPr lang="en-US" sz="3200" dirty="0">
+                          <a:latin typeface="Arial" panose="020B0604020202020204" pitchFamily="34" charset="0"/>
+                          <a:cs typeface="Arial" panose="020B0604020202020204" pitchFamily="34" charset="0"/>
+                        </a:rPr>
+                        <a:t>55.2%</a:t>
+                      </a:r>
+                    </a:p>
+                  </a:txBody>
+                  <a:tcPr anchor="ctr"/>
+                </a:tc>
+                <a:tc>
+                  <a:txBody>
+                    <a:bodyPr/>
+                    <a:lstStyle/>
+                    <a:p>
+                      <a:pPr algn="ctr"/>
+                      <a:r>
+                        <a:rPr lang="en-US" sz="3200" dirty="0">
+                          <a:latin typeface="Arial" panose="020B0604020202020204" pitchFamily="34" charset="0"/>
+                          <a:cs typeface="Arial" panose="020B0604020202020204" pitchFamily="34" charset="0"/>
+                        </a:rPr>
+                        <a:t>78.9%</a:t>
+                      </a:r>
+                    </a:p>
+                  </a:txBody>
+                  <a:tcPr anchor="ctr"/>
+                </a:tc>
+                <a:extLst>
+                  <a:ext uri="{0D108BD9-81ED-4DB2-BD59-A6C34878D82A}">
+                    <a16:rowId xmlns:a16="http://schemas.microsoft.com/office/drawing/2014/main" val="4162689415"/>
+                  </a:ext>
+                </a:extLst>
+              </a:tr>
+              <a:tr h="370840">
+                <a:tc>
+                  <a:txBody>
+                    <a:bodyPr/>
+                    <a:lstStyle/>
+                    <a:p>
+                      <a:pPr algn="l"/>
+                      <a:r>
+                        <a:rPr lang="en-US" sz="3200" b="1" dirty="0">
+                          <a:latin typeface="Arial" panose="020B0604020202020204" pitchFamily="34" charset="0"/>
+                          <a:cs typeface="Arial" panose="020B0604020202020204" pitchFamily="34" charset="0"/>
+                        </a:rPr>
+                        <a:t>2 Predictors</a:t>
+                      </a:r>
+                    </a:p>
+                  </a:txBody>
+                  <a:tcPr anchor="ctr"/>
+                </a:tc>
+                <a:tc>
+                  <a:txBody>
+                    <a:bodyPr/>
+                    <a:lstStyle/>
+                    <a:p>
+                      <a:pPr algn="ctr"/>
+                      <a:r>
+                        <a:rPr lang="en-US" sz="3200" dirty="0">
+                          <a:latin typeface="Arial" panose="020B0604020202020204" pitchFamily="34" charset="0"/>
+                          <a:cs typeface="Arial" panose="020B0604020202020204" pitchFamily="34" charset="0"/>
+                        </a:rPr>
+                        <a:t>71.8%</a:t>
+                      </a:r>
+                    </a:p>
+                  </a:txBody>
+                  <a:tcPr anchor="ctr"/>
+                </a:tc>
+                <a:tc>
+                  <a:txBody>
+                    <a:bodyPr/>
+                    <a:lstStyle/>
+                    <a:p>
+                      <a:pPr algn="ctr"/>
+                      <a:r>
+                        <a:rPr lang="en-US" sz="3200" dirty="0">
+                          <a:latin typeface="Arial" panose="020B0604020202020204" pitchFamily="34" charset="0"/>
+                          <a:cs typeface="Arial" panose="020B0604020202020204" pitchFamily="34" charset="0"/>
+                        </a:rPr>
+                        <a:t>46.6%</a:t>
+                      </a:r>
+                    </a:p>
+                  </a:txBody>
+                  <a:tcPr anchor="ctr"/>
+                </a:tc>
+                <a:tc>
+                  <a:txBody>
+                    <a:bodyPr/>
+                    <a:lstStyle/>
+                    <a:p>
+                      <a:pPr algn="ctr"/>
+                      <a:r>
+                        <a:rPr lang="en-US" sz="3200" dirty="0">
+                          <a:latin typeface="Arial" panose="020B0604020202020204" pitchFamily="34" charset="0"/>
+                          <a:cs typeface="Arial" panose="020B0604020202020204" pitchFamily="34" charset="0"/>
+                        </a:rPr>
+                        <a:t>86.3%</a:t>
+                      </a:r>
+                    </a:p>
+                  </a:txBody>
+                  <a:tcPr anchor="ctr"/>
+                </a:tc>
+                <a:extLst>
+                  <a:ext uri="{0D108BD9-81ED-4DB2-BD59-A6C34878D82A}">
+                    <a16:rowId xmlns:a16="http://schemas.microsoft.com/office/drawing/2014/main" val="1551476524"/>
+                  </a:ext>
+                </a:extLst>
+              </a:tr>
+              <a:tr h="370840">
+                <a:tc>
+                  <a:txBody>
+                    <a:bodyPr/>
+                    <a:lstStyle/>
+                    <a:p>
+                      <a:pPr algn="l"/>
+                      <a:r>
+                        <a:rPr lang="en-US" sz="3200" b="1" dirty="0">
+                          <a:latin typeface="Arial" panose="020B0604020202020204" pitchFamily="34" charset="0"/>
+                          <a:cs typeface="Arial" panose="020B0604020202020204" pitchFamily="34" charset="0"/>
+                        </a:rPr>
+                        <a:t>1 Predictor</a:t>
+                      </a:r>
+                    </a:p>
+                  </a:txBody>
+                  <a:tcPr anchor="ctr"/>
+                </a:tc>
+                <a:tc>
+                  <a:txBody>
+                    <a:bodyPr/>
+                    <a:lstStyle/>
+                    <a:p>
+                      <a:pPr algn="ctr"/>
+                      <a:r>
+                        <a:rPr lang="en-US" sz="3200" dirty="0">
+                          <a:latin typeface="Arial" panose="020B0604020202020204" pitchFamily="34" charset="0"/>
+                          <a:cs typeface="Arial" panose="020B0604020202020204" pitchFamily="34" charset="0"/>
+                        </a:rPr>
+                        <a:t>70.2%</a:t>
+                      </a:r>
+                    </a:p>
+                  </a:txBody>
+                  <a:tcPr anchor="ctr"/>
+                </a:tc>
+                <a:tc>
+                  <a:txBody>
+                    <a:bodyPr/>
+                    <a:lstStyle/>
+                    <a:p>
+                      <a:pPr algn="ctr"/>
+                      <a:r>
+                        <a:rPr lang="en-US" sz="3200" dirty="0">
+                          <a:latin typeface="Arial" panose="020B0604020202020204" pitchFamily="34" charset="0"/>
+                          <a:cs typeface="Arial" panose="020B0604020202020204" pitchFamily="34" charset="0"/>
+                        </a:rPr>
+                        <a:t>55.2%</a:t>
+                      </a:r>
+                    </a:p>
+                  </a:txBody>
+                  <a:tcPr anchor="ctr"/>
+                </a:tc>
+                <a:tc>
+                  <a:txBody>
+                    <a:bodyPr/>
+                    <a:lstStyle/>
+                    <a:p>
+                      <a:pPr algn="ctr"/>
+                      <a:r>
+                        <a:rPr lang="en-US" sz="3200" dirty="0">
+                          <a:latin typeface="Arial" panose="020B0604020202020204" pitchFamily="34" charset="0"/>
+                          <a:cs typeface="Arial" panose="020B0604020202020204" pitchFamily="34" charset="0"/>
+                        </a:rPr>
+                        <a:t>78.9%</a:t>
+                      </a:r>
+                    </a:p>
+                  </a:txBody>
+                  <a:tcPr anchor="ctr"/>
+                </a:tc>
+                <a:extLst>
+                  <a:ext uri="{0D108BD9-81ED-4DB2-BD59-A6C34878D82A}">
+                    <a16:rowId xmlns:a16="http://schemas.microsoft.com/office/drawing/2014/main" val="1940787544"/>
+                  </a:ext>
+                </a:extLst>
+              </a:tr>
+            </a:tbl>
+          </a:graphicData>
+        </a:graphic>
+      </p:graphicFrame>
+      <p:pic>
+        <p:nvPicPr>
+          <p:cNvPr id="47" name="Picture 46" descr="Chart, bar chart&#10;&#10;Description automatically generated">
+            <a:extLst>
+              <a:ext uri="{FF2B5EF4-FFF2-40B4-BE49-F238E27FC236}">
+                <a16:creationId xmlns:a16="http://schemas.microsoft.com/office/drawing/2014/main" id="{5A9EA086-D8BF-C678-53C0-5AE5FCDB5509}"/>
+              </a:ext>
+            </a:extLst>
+          </p:cNvPr>
+          <p:cNvPicPr>
+            <a:picLocks noChangeAspect="1"/>
+          </p:cNvPicPr>
+          <p:nvPr/>
+        </p:nvPicPr>
+        <p:blipFill rotWithShape="1">
+          <a:blip r:embed="rId10">
+            <a:extLst>
+              <a:ext uri="{28A0092B-C50C-407E-A947-70E740481C1C}">
+                <a14:useLocalDpi xmlns:a14="http://schemas.microsoft.com/office/drawing/2010/main" val="0"/>
+              </a:ext>
+            </a:extLst>
+          </a:blip>
+          <a:srcRect t="5102" r="3672"/>
+          <a:stretch/>
+        </p:blipFill>
+        <p:spPr>
+          <a:xfrm>
+            <a:off x="15873331" y="26457236"/>
+            <a:ext cx="10137964" cy="6112476"/>
+          </a:xfrm>
+          <a:prstGeom prst="rect">
+            <a:avLst/>
+          </a:prstGeom>
+        </p:spPr>
+      </p:pic>
+      <p:sp>
+        <p:nvSpPr>
+          <p:cNvPr id="48" name="TextBox 47">
+            <a:extLst>
+              <a:ext uri="{FF2B5EF4-FFF2-40B4-BE49-F238E27FC236}">
+                <a16:creationId xmlns:a16="http://schemas.microsoft.com/office/drawing/2014/main" id="{4CA7EF85-C412-CA94-EFA1-E363D3EC6F0F}"/>
+              </a:ext>
+            </a:extLst>
+          </p:cNvPr>
+          <p:cNvSpPr txBox="1"/>
+          <p:nvPr/>
+        </p:nvSpPr>
+        <p:spPr>
+          <a:xfrm>
+            <a:off x="17102415" y="25966862"/>
+            <a:ext cx="11635872" cy="523220"/>
+          </a:xfrm>
+          <a:prstGeom prst="rect">
+            <a:avLst/>
+          </a:prstGeom>
+          <a:noFill/>
+        </p:spPr>
+        <p:txBody>
+          <a:bodyPr wrap="square">
+            <a:spAutoFit/>
+          </a:bodyPr>
+          <a:lstStyle/>
+          <a:p>
+            <a:r>
+              <a:rPr lang="en-US" sz="2700" dirty="0">
+                <a:solidFill>
+                  <a:srgbClr val="000000"/>
+                </a:solidFill>
+                <a:latin typeface="Arial" panose="020B0604020202020204" pitchFamily="34" charset="0"/>
+                <a:cs typeface="Arial" panose="020B0604020202020204" pitchFamily="34" charset="0"/>
+              </a:rPr>
+              <a:t>Random Forest Variable Importance</a:t>
+            </a:r>
+            <a:endParaRPr lang="en-US" sz="2700" dirty="0"/>
+          </a:p>
+        </p:txBody>
+      </p:sp>
+      <p:sp>
+        <p:nvSpPr>
+          <p:cNvPr id="51" name="TextBox 50">
+            <a:extLst>
+              <a:ext uri="{FF2B5EF4-FFF2-40B4-BE49-F238E27FC236}">
+                <a16:creationId xmlns:a16="http://schemas.microsoft.com/office/drawing/2014/main" id="{48EF423C-3819-5324-ADF8-563F19BAFDCA}"/>
+              </a:ext>
+            </a:extLst>
+          </p:cNvPr>
+          <p:cNvSpPr txBox="1"/>
+          <p:nvPr/>
+        </p:nvSpPr>
+        <p:spPr>
+          <a:xfrm>
+            <a:off x="15126684" y="32308800"/>
+            <a:ext cx="13556308" cy="523220"/>
+          </a:xfrm>
+          <a:prstGeom prst="rect">
+            <a:avLst/>
+          </a:prstGeom>
+          <a:noFill/>
+        </p:spPr>
+        <p:txBody>
+          <a:bodyPr rot="0" spcFirstLastPara="0" vertOverflow="overflow" horzOverflow="overflow" vert="horz" wrap="square" lIns="91440" tIns="45720" rIns="91440" bIns="45720" numCol="1" spcCol="0" rtlCol="0" fromWordArt="0" anchor="t" anchorCtr="0" forceAA="0" compatLnSpc="1">
+            <a:prstTxWarp prst="textNoShape">
+              <a:avLst/>
+            </a:prstTxWarp>
+            <a:spAutoFit/>
+          </a:bodyPr>
+          <a:lstStyle/>
+          <a:p>
+            <a:r>
+              <a:rPr lang="en-US" sz="2800" b="1" i="0" dirty="0">
+                <a:solidFill>
+                  <a:srgbClr val="000000"/>
+                </a:solidFill>
+                <a:effectLst/>
+                <a:latin typeface="Arial" panose="020B0604020202020204" pitchFamily="34" charset="0"/>
+                <a:cs typeface="Arial" panose="020B0604020202020204" pitchFamily="34" charset="0"/>
+              </a:rPr>
+              <a:t>Figure </a:t>
+            </a:r>
+            <a:r>
+              <a:rPr lang="en-US" sz="2800" b="1" dirty="0">
+                <a:solidFill>
+                  <a:srgbClr val="000000"/>
+                </a:solidFill>
+                <a:latin typeface="Arial" panose="020B0604020202020204" pitchFamily="34" charset="0"/>
+                <a:cs typeface="Arial" panose="020B0604020202020204" pitchFamily="34" charset="0"/>
+              </a:rPr>
+              <a:t>2</a:t>
+            </a:r>
+            <a:r>
+              <a:rPr lang="en-US" sz="2800" b="1" i="0" dirty="0">
+                <a:solidFill>
+                  <a:srgbClr val="000000"/>
+                </a:solidFill>
+                <a:effectLst/>
+                <a:latin typeface="Arial" panose="020B0604020202020204" pitchFamily="34" charset="0"/>
+                <a:cs typeface="Arial" panose="020B0604020202020204" pitchFamily="34" charset="0"/>
+              </a:rPr>
+              <a:t>: Variable importance according to mean decrease in Gini Index. </a:t>
+            </a:r>
+          </a:p>
+        </p:txBody>
+      </p:sp>
+      <p:sp>
+        <p:nvSpPr>
+          <p:cNvPr id="52" name="TextBox 51">
+            <a:extLst>
+              <a:ext uri="{FF2B5EF4-FFF2-40B4-BE49-F238E27FC236}">
+                <a16:creationId xmlns:a16="http://schemas.microsoft.com/office/drawing/2014/main" id="{4A313B24-0E04-BC2F-B00B-9C28AC704174}"/>
+              </a:ext>
+            </a:extLst>
+          </p:cNvPr>
+          <p:cNvSpPr txBox="1"/>
+          <p:nvPr/>
+        </p:nvSpPr>
+        <p:spPr>
+          <a:xfrm>
+            <a:off x="32113728" y="28291536"/>
+            <a:ext cx="184731" cy="1138773"/>
+          </a:xfrm>
+          <a:prstGeom prst="rect">
+            <a:avLst/>
+          </a:prstGeom>
+          <a:noFill/>
+        </p:spPr>
+        <p:txBody>
+          <a:bodyPr wrap="none" rtlCol="0">
+            <a:spAutoFit/>
+          </a:bodyPr>
+          <a:lstStyle/>
+          <a:p>
+            <a:endParaRPr lang="en-US" dirty="0"/>
+          </a:p>
+        </p:txBody>
+      </p:sp>
     </p:spTree>
   </p:cSld>
   <p:clrMapOvr>
@@ -9128,15 +9876,6 @@
 </file>
 
 <file path=customXml/item2.xml><?xml version="1.0" encoding="utf-8"?>
-<?mso-contentType ?>
-<FormTemplates xmlns="http://schemas.microsoft.com/sharepoint/v3/contenttype/forms">
-  <Display>DocumentLibraryForm</Display>
-  <Edit>DocumentLibraryForm</Edit>
-  <New>DocumentLibraryForm</New>
-</FormTemplates>
-</file>
-
-<file path=customXml/item3.xml><?xml version="1.0" encoding="utf-8"?>
 <ct:contentTypeSchema xmlns:ct="http://schemas.microsoft.com/office/2006/metadata/contentType" xmlns:ma="http://schemas.microsoft.com/office/2006/metadata/properties/metaAttributes" ct:_="" ma:_="" ma:contentTypeName="Document" ma:contentTypeID="0x01010040C0573D451389478D071ED69F950D05" ma:contentTypeVersion="7" ma:contentTypeDescription="Create a new document." ma:contentTypeScope="" ma:versionID="dfc8d1046dc9a0a0ca1ccad4854daea3">
   <xsd:schema xmlns:xsd="http://www.w3.org/2001/XMLSchema" xmlns:xs="http://www.w3.org/2001/XMLSchema" xmlns:p="http://schemas.microsoft.com/office/2006/metadata/properties" xmlns:ns3="245286d6-ca1e-4f0e-8c79-12db02d5542a" xmlns:ns4="e0ad1755-6d7c-4bfc-bbbb-14f2c67b4daf" targetNamespace="http://schemas.microsoft.com/office/2006/metadata/properties" ma:root="true" ma:fieldsID="bb8de4af8b0c04f7d0f855658f6a8a54" ns3:_="" ns4:_="">
     <xsd:import namespace="245286d6-ca1e-4f0e-8c79-12db02d5542a"/>
@@ -9321,6 +10060,15 @@
 </ct:contentTypeSchema>
 </file>
 
+<file path=customXml/item3.xml><?xml version="1.0" encoding="utf-8"?>
+<?mso-contentType ?>
+<FormTemplates xmlns="http://schemas.microsoft.com/sharepoint/v3/contenttype/forms">
+  <Display>DocumentLibraryForm</Display>
+  <Edit>DocumentLibraryForm</Edit>
+  <New>DocumentLibraryForm</New>
+</FormTemplates>
+</file>
+
 <file path=customXml/itemProps1.xml><?xml version="1.0" encoding="utf-8"?>
 <ds:datastoreItem xmlns:ds="http://schemas.openxmlformats.org/officeDocument/2006/customXml" ds:itemID="{EF364131-D24C-403E-884D-E36F69FCD0FB}">
   <ds:schemaRefs>
@@ -9339,14 +10087,6 @@
 </file>
 
 <file path=customXml/itemProps2.xml><?xml version="1.0" encoding="utf-8"?>
-<ds:datastoreItem xmlns:ds="http://schemas.openxmlformats.org/officeDocument/2006/customXml" ds:itemID="{D4781661-AC2E-4F0F-AB30-9889357224B1}">
-  <ds:schemaRefs>
-    <ds:schemaRef ds:uri="http://schemas.microsoft.com/sharepoint/v3/contenttype/forms"/>
-  </ds:schemaRefs>
-</ds:datastoreItem>
-</file>
-
-<file path=customXml/itemProps3.xml><?xml version="1.0" encoding="utf-8"?>
 <ds:datastoreItem xmlns:ds="http://schemas.openxmlformats.org/officeDocument/2006/customXml" ds:itemID="{C9E8422E-BBBE-4621-92A5-3F6338502613}">
   <ds:schemaRefs>
     <ds:schemaRef ds:uri="245286d6-ca1e-4f0e-8c79-12db02d5542a"/>
@@ -9363,4 +10103,12 @@
     <ds:schemaRef ds:uri="http://www.w3.org/2001/XMLSchema"/>
   </ds:schemaRefs>
 </ds:datastoreItem>
+</file>
+
+<file path=customXml/itemProps3.xml><?xml version="1.0" encoding="utf-8"?>
+<ds:datastoreItem xmlns:ds="http://schemas.openxmlformats.org/officeDocument/2006/customXml" ds:itemID="{D4781661-AC2E-4F0F-AB30-9889357224B1}">
+  <ds:schemaRefs>
+    <ds:schemaRef ds:uri="http://schemas.microsoft.com/sharepoint/v3/contenttype/forms"/>
+  </ds:schemaRefs>
+</ds:datastoreItem>
 </file>
</xml_diff>